<commit_message>
Labb 1 nästan färdig.
</commit_message>
<xml_diff>
--- a/Labb 1/Laboration1.pptx
+++ b/Labb 1/Laboration1.pptx
@@ -11,6 +11,7 @@
     <p:sldId id="258" r:id="rId5"/>
     <p:sldId id="259" r:id="rId6"/>
     <p:sldId id="260" r:id="rId7"/>
+    <p:sldId id="262" r:id="rId8"/>
   </p:sldIdLst>
   <p:sldSz cx="9144000" cy="6858000" type="screen4x3"/>
   <p:notesSz cx="6858000" cy="9144000"/>
@@ -293,7 +294,7 @@
           <a:p>
             <a:fld id="{347BD319-C441-4740-BDB2-35E25C52CCE7}" type="datetimeFigureOut">
               <a:rPr lang="sv-SE" smtClean="0"/>
-              <a:t>2014-01-22</a:t>
+              <a:t>2014-01-24</a:t>
             </a:fld>
             <a:endParaRPr lang="sv-SE"/>
           </a:p>
@@ -458,7 +459,7 @@
           <a:p>
             <a:fld id="{347BD319-C441-4740-BDB2-35E25C52CCE7}" type="datetimeFigureOut">
               <a:rPr lang="sv-SE" smtClean="0"/>
-              <a:t>2014-01-22</a:t>
+              <a:t>2014-01-24</a:t>
             </a:fld>
             <a:endParaRPr lang="sv-SE"/>
           </a:p>
@@ -633,7 +634,7 @@
           <a:p>
             <a:fld id="{347BD319-C441-4740-BDB2-35E25C52CCE7}" type="datetimeFigureOut">
               <a:rPr lang="sv-SE" smtClean="0"/>
-              <a:t>2014-01-22</a:t>
+              <a:t>2014-01-24</a:t>
             </a:fld>
             <a:endParaRPr lang="sv-SE"/>
           </a:p>
@@ -798,7 +799,7 @@
           <a:p>
             <a:fld id="{347BD319-C441-4740-BDB2-35E25C52CCE7}" type="datetimeFigureOut">
               <a:rPr lang="sv-SE" smtClean="0"/>
-              <a:t>2014-01-22</a:t>
+              <a:t>2014-01-24</a:t>
             </a:fld>
             <a:endParaRPr lang="sv-SE"/>
           </a:p>
@@ -1039,7 +1040,7 @@
           <a:p>
             <a:fld id="{347BD319-C441-4740-BDB2-35E25C52CCE7}" type="datetimeFigureOut">
               <a:rPr lang="sv-SE" smtClean="0"/>
-              <a:t>2014-01-22</a:t>
+              <a:t>2014-01-24</a:t>
             </a:fld>
             <a:endParaRPr lang="sv-SE"/>
           </a:p>
@@ -1322,7 +1323,7 @@
           <a:p>
             <a:fld id="{347BD319-C441-4740-BDB2-35E25C52CCE7}" type="datetimeFigureOut">
               <a:rPr lang="sv-SE" smtClean="0"/>
-              <a:t>2014-01-22</a:t>
+              <a:t>2014-01-24</a:t>
             </a:fld>
             <a:endParaRPr lang="sv-SE"/>
           </a:p>
@@ -1739,7 +1740,7 @@
           <a:p>
             <a:fld id="{347BD319-C441-4740-BDB2-35E25C52CCE7}" type="datetimeFigureOut">
               <a:rPr lang="sv-SE" smtClean="0"/>
-              <a:t>2014-01-22</a:t>
+              <a:t>2014-01-24</a:t>
             </a:fld>
             <a:endParaRPr lang="sv-SE"/>
           </a:p>
@@ -1852,7 +1853,7 @@
           <a:p>
             <a:fld id="{347BD319-C441-4740-BDB2-35E25C52CCE7}" type="datetimeFigureOut">
               <a:rPr lang="sv-SE" smtClean="0"/>
-              <a:t>2014-01-22</a:t>
+              <a:t>2014-01-24</a:t>
             </a:fld>
             <a:endParaRPr lang="sv-SE"/>
           </a:p>
@@ -1942,7 +1943,7 @@
           <a:p>
             <a:fld id="{347BD319-C441-4740-BDB2-35E25C52CCE7}" type="datetimeFigureOut">
               <a:rPr lang="sv-SE" smtClean="0"/>
-              <a:t>2014-01-22</a:t>
+              <a:t>2014-01-24</a:t>
             </a:fld>
             <a:endParaRPr lang="sv-SE"/>
           </a:p>
@@ -2214,7 +2215,7 @@
           <a:p>
             <a:fld id="{347BD319-C441-4740-BDB2-35E25C52CCE7}" type="datetimeFigureOut">
               <a:rPr lang="sv-SE" smtClean="0"/>
-              <a:t>2014-01-22</a:t>
+              <a:t>2014-01-24</a:t>
             </a:fld>
             <a:endParaRPr lang="sv-SE"/>
           </a:p>
@@ -2462,7 +2463,7 @@
           <a:p>
             <a:fld id="{347BD319-C441-4740-BDB2-35E25C52CCE7}" type="datetimeFigureOut">
               <a:rPr lang="sv-SE" smtClean="0"/>
-              <a:t>2014-01-22</a:t>
+              <a:t>2014-01-24</a:t>
             </a:fld>
             <a:endParaRPr lang="sv-SE"/>
           </a:p>
@@ -2670,7 +2671,7 @@
           <a:p>
             <a:fld id="{347BD319-C441-4740-BDB2-35E25C52CCE7}" type="datetimeFigureOut">
               <a:rPr lang="sv-SE" smtClean="0"/>
-              <a:t>2014-01-22</a:t>
+              <a:t>2014-01-24</a:t>
             </a:fld>
             <a:endParaRPr lang="sv-SE"/>
           </a:p>
@@ -3056,6 +3057,20 @@
             <a:ext cx="8229600" cy="3816424"/>
           </a:xfrm>
         </p:spPr>
+        <p:style>
+          <a:lnRef idx="1">
+            <a:schemeClr val="accent1"/>
+          </a:lnRef>
+          <a:fillRef idx="2">
+            <a:schemeClr val="accent1"/>
+          </a:fillRef>
+          <a:effectRef idx="1">
+            <a:schemeClr val="accent1"/>
+          </a:effectRef>
+          <a:fontRef idx="minor">
+            <a:schemeClr val="dk1"/>
+          </a:fontRef>
+        </p:style>
         <p:txBody>
           <a:bodyPr>
             <a:normAutofit/>
@@ -3133,7 +3148,7 @@
         </p:nvSpPr>
         <p:spPr>
           <a:xfrm>
-            <a:off x="1154076" y="1700808"/>
+            <a:off x="479490" y="1772816"/>
             <a:ext cx="936625" cy="503238"/>
           </a:xfrm>
           <a:prstGeom prst="rect">
@@ -3199,14 +3214,27 @@
         </p:nvSpPr>
         <p:spPr>
           <a:xfrm>
-            <a:off x="1187624" y="548680"/>
+            <a:off x="467544" y="1124744"/>
             <a:ext cx="2353721" cy="369332"/>
           </a:xfrm>
           <a:prstGeom prst="rect">
             <a:avLst/>
           </a:prstGeom>
-          <a:noFill/>
         </p:spPr>
+        <p:style>
+          <a:lnRef idx="1">
+            <a:schemeClr val="accent1"/>
+          </a:lnRef>
+          <a:fillRef idx="2">
+            <a:schemeClr val="accent1"/>
+          </a:fillRef>
+          <a:effectRef idx="1">
+            <a:schemeClr val="accent1"/>
+          </a:effectRef>
+          <a:fontRef idx="minor">
+            <a:schemeClr val="dk1"/>
+          </a:fontRef>
+        </p:style>
         <p:txBody>
           <a:bodyPr wrap="none" rtlCol="0">
             <a:spAutoFit/>
@@ -3230,25 +3258,25 @@
           <p:nvPr>
             <p:extLst>
               <p:ext uri="{D42A27DB-BD31-4B8C-83A1-F6EECF244321}">
-                <p14:modId xmlns:p14="http://schemas.microsoft.com/office/powerpoint/2010/main" val="3158525340"/>
+                <p14:modId xmlns:p14="http://schemas.microsoft.com/office/powerpoint/2010/main" val="280123830"/>
               </p:ext>
             </p:extLst>
           </p:nvPr>
         </p:nvGraphicFramePr>
         <p:xfrm>
-          <a:off x="3275856" y="1700808"/>
+          <a:off x="2339752" y="1772816"/>
           <a:ext cx="1228725" cy="1343025"/>
         </p:xfrm>
         <a:graphic>
           <a:graphicData uri="http://schemas.openxmlformats.org/presentationml/2006/ole">
             <mc:AlternateContent xmlns:mc="http://schemas.openxmlformats.org/markup-compatibility/2006">
               <mc:Choice xmlns:v="urn:schemas-microsoft-com:vml" Requires="v">
-                <p:oleObj spid="_x0000_s2052" name="Worksheet" r:id="rId3" imgW="1228619" imgH="1343141" progId="Excel.Sheet.12">
+                <p:oleObj spid="_x0000_s2062" name="Worksheet" r:id="rId3" imgW="1228835" imgH="1342980" progId="Excel.Sheet.12">
                   <p:embed/>
                 </p:oleObj>
               </mc:Choice>
               <mc:Fallback>
-                <p:oleObj name="Worksheet" r:id="rId3" imgW="1228619" imgH="1343141" progId="Excel.Sheet.12">
+                <p:oleObj name="Worksheet" r:id="rId3" imgW="1228835" imgH="1342980" progId="Excel.Sheet.12">
                   <p:embed/>
                   <p:pic>
                     <p:nvPicPr>
@@ -3267,7 +3295,7 @@
                     </p:blipFill>
                     <p:spPr bwMode="auto">
                       <a:xfrm>
-                        <a:off x="3275856" y="1700808"/>
+                        <a:off x="2339752" y="1772816"/>
                         <a:ext cx="1228725" cy="1343025"/>
                       </a:xfrm>
                       <a:prstGeom prst="rect">
@@ -3322,7 +3350,7 @@
         </p:nvSpPr>
         <p:spPr>
           <a:xfrm>
-            <a:off x="2725700" y="1767761"/>
+            <a:off x="1835696" y="1791516"/>
             <a:ext cx="380232" cy="369332"/>
           </a:xfrm>
           <a:prstGeom prst="rect">
@@ -3339,6 +3367,146 @@
             <a:r>
               <a:rPr lang="sv-SE" dirty="0" smtClean="0"/>
               <a:t>A:</a:t>
+            </a:r>
+            <a:endParaRPr lang="sv-SE" dirty="0"/>
+          </a:p>
+        </p:txBody>
+      </p:sp>
+      <p:sp>
+        <p:nvSpPr>
+          <p:cNvPr id="6" name="Title 1"/>
+          <p:cNvSpPr txBox="1">
+            <a:spLocks/>
+          </p:cNvSpPr>
+          <p:nvPr/>
+        </p:nvSpPr>
+        <p:spPr>
+          <a:xfrm>
+            <a:off x="323528" y="274638"/>
+            <a:ext cx="8064896" cy="571500"/>
+          </a:xfrm>
+          <a:prstGeom prst="rect">
+            <a:avLst/>
+          </a:prstGeom>
+        </p:spPr>
+        <p:style>
+          <a:lnRef idx="1">
+            <a:schemeClr val="accent1"/>
+          </a:lnRef>
+          <a:fillRef idx="2">
+            <a:schemeClr val="accent1"/>
+          </a:fillRef>
+          <a:effectRef idx="1">
+            <a:schemeClr val="accent1"/>
+          </a:effectRef>
+          <a:fontRef idx="minor">
+            <a:schemeClr val="dk1"/>
+          </a:fontRef>
+        </p:style>
+        <p:txBody>
+          <a:bodyPr vert="horz" lIns="91440" tIns="45720" rIns="91440" bIns="45720" rtlCol="0" anchor="ctr">
+            <a:normAutofit fontScale="85000" lnSpcReduction="20000"/>
+          </a:bodyPr>
+          <a:lstStyle>
+            <a:lvl1pPr algn="ctr" defTabSz="914400" rtl="0" eaLnBrk="1" latinLnBrk="0" hangingPunct="1">
+              <a:spcBef>
+                <a:spcPct val="0"/>
+              </a:spcBef>
+              <a:buNone/>
+              <a:defRPr sz="4400" kern="1200">
+                <a:solidFill>
+                  <a:schemeClr val="dk1"/>
+                </a:solidFill>
+                <a:latin typeface="+mn-lt"/>
+                <a:ea typeface="+mn-ea"/>
+                <a:cs typeface="+mn-cs"/>
+              </a:defRPr>
+            </a:lvl1pPr>
+            <a:lvl2pPr>
+              <a:defRPr>
+                <a:solidFill>
+                  <a:schemeClr val="dk1"/>
+                </a:solidFill>
+                <a:latin typeface="+mn-lt"/>
+                <a:ea typeface="+mn-ea"/>
+                <a:cs typeface="+mn-cs"/>
+              </a:defRPr>
+            </a:lvl2pPr>
+            <a:lvl3pPr>
+              <a:defRPr>
+                <a:solidFill>
+                  <a:schemeClr val="dk1"/>
+                </a:solidFill>
+                <a:latin typeface="+mn-lt"/>
+                <a:ea typeface="+mn-ea"/>
+                <a:cs typeface="+mn-cs"/>
+              </a:defRPr>
+            </a:lvl3pPr>
+            <a:lvl4pPr>
+              <a:defRPr>
+                <a:solidFill>
+                  <a:schemeClr val="dk1"/>
+                </a:solidFill>
+                <a:latin typeface="+mn-lt"/>
+                <a:ea typeface="+mn-ea"/>
+                <a:cs typeface="+mn-cs"/>
+              </a:defRPr>
+            </a:lvl4pPr>
+            <a:lvl5pPr>
+              <a:defRPr>
+                <a:solidFill>
+                  <a:schemeClr val="dk1"/>
+                </a:solidFill>
+                <a:latin typeface="+mn-lt"/>
+                <a:ea typeface="+mn-ea"/>
+                <a:cs typeface="+mn-cs"/>
+              </a:defRPr>
+            </a:lvl5pPr>
+            <a:lvl6pPr>
+              <a:defRPr>
+                <a:solidFill>
+                  <a:schemeClr val="dk1"/>
+                </a:solidFill>
+                <a:latin typeface="+mn-lt"/>
+                <a:ea typeface="+mn-ea"/>
+                <a:cs typeface="+mn-cs"/>
+              </a:defRPr>
+            </a:lvl6pPr>
+            <a:lvl7pPr>
+              <a:defRPr>
+                <a:solidFill>
+                  <a:schemeClr val="dk1"/>
+                </a:solidFill>
+                <a:latin typeface="+mn-lt"/>
+                <a:ea typeface="+mn-ea"/>
+                <a:cs typeface="+mn-cs"/>
+              </a:defRPr>
+            </a:lvl7pPr>
+            <a:lvl8pPr>
+              <a:defRPr>
+                <a:solidFill>
+                  <a:schemeClr val="dk1"/>
+                </a:solidFill>
+                <a:latin typeface="+mn-lt"/>
+                <a:ea typeface="+mn-ea"/>
+                <a:cs typeface="+mn-cs"/>
+              </a:defRPr>
+            </a:lvl8pPr>
+            <a:lvl9pPr>
+              <a:defRPr>
+                <a:solidFill>
+                  <a:schemeClr val="dk1"/>
+                </a:solidFill>
+                <a:latin typeface="+mn-lt"/>
+                <a:ea typeface="+mn-ea"/>
+                <a:cs typeface="+mn-cs"/>
+              </a:defRPr>
+            </a:lvl9pPr>
+          </a:lstStyle>
+          <a:p>
+            <a:r>
+              <a:rPr lang="sv-SE" dirty="0" smtClean="0"/>
+              <a:t>Uppgift 1 – Nycklar</a:t>
             </a:r>
             <a:endParaRPr lang="sv-SE" dirty="0"/>
           </a:p>
@@ -3382,7 +3550,7 @@
         </p:nvSpPr>
         <p:spPr>
           <a:xfrm>
-            <a:off x="3635896" y="1408361"/>
+            <a:off x="1165858" y="1768871"/>
             <a:ext cx="936625" cy="503238"/>
           </a:xfrm>
           <a:prstGeom prst="rect">
@@ -3424,120 +3592,17 @@
               </a:spcAft>
               <a:defRPr/>
             </a:pPr>
-            <a:endParaRPr lang="sv-SE" dirty="0">
-              <a:solidFill>
-                <a:schemeClr val="tx1"/>
-              </a:solidFill>
-            </a:endParaRPr>
-          </a:p>
-        </p:txBody>
-      </p:sp>
-      <p:grpSp>
-        <p:nvGrpSpPr>
-          <p:cNvPr id="6" name="Grupp 7"/>
-          <p:cNvGrpSpPr>
-            <a:grpSpLocks/>
-          </p:cNvGrpSpPr>
-          <p:nvPr/>
-        </p:nvGrpSpPr>
-        <p:grpSpPr bwMode="auto">
-          <a:xfrm>
-            <a:off x="1331640" y="1371055"/>
-            <a:ext cx="936625" cy="288925"/>
-            <a:chOff x="2555776" y="692696"/>
-            <a:chExt cx="936104" cy="288032"/>
-          </a:xfrm>
-        </p:grpSpPr>
-        <p:cxnSp>
-          <p:nvCxnSpPr>
-            <p:cNvPr id="7" name="Rak 5"/>
-            <p:cNvCxnSpPr/>
-            <p:nvPr/>
-          </p:nvCxnSpPr>
-          <p:spPr>
-            <a:xfrm>
-              <a:off x="2555776" y="836712"/>
-              <a:ext cx="936104" cy="0"/>
-            </a:xfrm>
-            <a:prstGeom prst="line">
-              <a:avLst/>
-            </a:prstGeom>
-            <a:ln w="9525">
-              <a:solidFill>
-                <a:schemeClr val="tx1"/>
-              </a:solidFill>
-            </a:ln>
-          </p:spPr>
-          <p:style>
-            <a:lnRef idx="1">
-              <a:schemeClr val="accent1"/>
-            </a:lnRef>
-            <a:fillRef idx="0">
-              <a:schemeClr val="accent1"/>
-            </a:fillRef>
-            <a:effectRef idx="0">
-              <a:schemeClr val="accent1"/>
-            </a:effectRef>
-            <a:fontRef idx="minor">
-              <a:schemeClr val="tx1"/>
-            </a:fontRef>
-          </p:style>
-        </p:cxnSp>
-        <p:sp>
-          <p:nvSpPr>
-            <p:cNvPr id="8" name="Rektangel 6"/>
-            <p:cNvSpPr/>
-            <p:nvPr/>
-          </p:nvSpPr>
-          <p:spPr>
-            <a:xfrm>
-              <a:off x="3420483" y="692696"/>
-              <a:ext cx="71397" cy="288032"/>
-            </a:xfrm>
-            <a:prstGeom prst="rect">
-              <a:avLst/>
-            </a:prstGeom>
-            <a:noFill/>
-            <a:ln w="9525">
-              <a:solidFill>
-                <a:schemeClr val="tx1"/>
-              </a:solidFill>
-            </a:ln>
-          </p:spPr>
-          <p:style>
-            <a:lnRef idx="2">
-              <a:schemeClr val="accent1">
-                <a:shade val="50000"/>
-              </a:schemeClr>
-            </a:lnRef>
-            <a:fillRef idx="1">
-              <a:schemeClr val="accent1"/>
-            </a:fillRef>
-            <a:effectRef idx="0">
-              <a:schemeClr val="accent1"/>
-            </a:effectRef>
-            <a:fontRef idx="minor">
-              <a:schemeClr val="lt1"/>
-            </a:fontRef>
-          </p:style>
-          <p:txBody>
-            <a:bodyPr anchor="ctr"/>
-            <a:lstStyle/>
-            <a:p>
-              <a:pPr algn="ctr" fontAlgn="auto">
-                <a:spcBef>
-                  <a:spcPts val="0"/>
-                </a:spcBef>
-                <a:spcAft>
-                  <a:spcPts val="0"/>
-                </a:spcAft>
-                <a:defRPr/>
-              </a:pPr>
-              <a:endParaRPr lang="sv-SE"/>
-            </a:p>
-          </p:txBody>
-        </p:sp>
-      </p:grpSp>
+            <a:r>
+              <a:rPr lang="sv-SE" dirty="0">
+                <a:solidFill>
+                  <a:schemeClr val="tx1"/>
+                </a:solidFill>
+              </a:rPr>
+              <a:t>A</a:t>
+            </a:r>
+          </a:p>
+        </p:txBody>
+      </p:sp>
       <p:grpSp>
         <p:nvGrpSpPr>
           <p:cNvPr id="9" name="Grupp 15"/>
@@ -3548,7 +3613,7 @@
         </p:nvGrpSpPr>
         <p:grpSpPr bwMode="auto">
           <a:xfrm>
-            <a:off x="4842917" y="1556792"/>
+            <a:off x="2102484" y="1880790"/>
             <a:ext cx="1079500" cy="288925"/>
             <a:chOff x="4499992" y="692696"/>
             <a:chExt cx="1080120" cy="288032"/>
@@ -3831,8 +3896,210 @@
         </p:nvSpPr>
         <p:spPr>
           <a:xfrm>
-            <a:off x="1187624" y="548680"/>
+            <a:off x="395536" y="733346"/>
             <a:ext cx="3988721" cy="369332"/>
+          </a:xfrm>
+          <a:prstGeom prst="rect">
+            <a:avLst/>
+          </a:prstGeom>
+        </p:spPr>
+        <p:style>
+          <a:lnRef idx="1">
+            <a:schemeClr val="accent1"/>
+          </a:lnRef>
+          <a:fillRef idx="2">
+            <a:schemeClr val="accent1"/>
+          </a:fillRef>
+          <a:effectRef idx="1">
+            <a:schemeClr val="accent1"/>
+          </a:effectRef>
+          <a:fontRef idx="minor">
+            <a:schemeClr val="dk1"/>
+          </a:fontRef>
+        </p:style>
+        <p:txBody>
+          <a:bodyPr wrap="none" rtlCol="0">
+            <a:spAutoFit/>
+          </a:bodyPr>
+          <a:lstStyle/>
+          <a:p>
+            <a:r>
+              <a:rPr lang="sv-SE" dirty="0" smtClean="0"/>
+              <a:t>1.2 Relationsobjekt (”Många till många”)</a:t>
+            </a:r>
+            <a:endParaRPr lang="sv-SE" dirty="0"/>
+          </a:p>
+        </p:txBody>
+      </p:sp>
+      <p:sp>
+        <p:nvSpPr>
+          <p:cNvPr id="18" name="Rektangel 3"/>
+          <p:cNvSpPr/>
+          <p:nvPr/>
+        </p:nvSpPr>
+        <p:spPr>
+          <a:xfrm>
+            <a:off x="3191772" y="1768871"/>
+            <a:ext cx="936625" cy="503238"/>
+          </a:xfrm>
+          <a:prstGeom prst="rect">
+            <a:avLst/>
+          </a:prstGeom>
+          <a:noFill/>
+          <a:ln>
+            <a:solidFill>
+              <a:schemeClr val="tx1"/>
+            </a:solidFill>
+          </a:ln>
+        </p:spPr>
+        <p:style>
+          <a:lnRef idx="2">
+            <a:schemeClr val="accent1">
+              <a:shade val="50000"/>
+            </a:schemeClr>
+          </a:lnRef>
+          <a:fillRef idx="1">
+            <a:schemeClr val="accent1"/>
+          </a:fillRef>
+          <a:effectRef idx="0">
+            <a:schemeClr val="accent1"/>
+          </a:effectRef>
+          <a:fontRef idx="minor">
+            <a:schemeClr val="lt1"/>
+          </a:fontRef>
+        </p:style>
+        <p:txBody>
+          <a:bodyPr anchor="ctr"/>
+          <a:lstStyle/>
+          <a:p>
+            <a:pPr algn="ctr" fontAlgn="auto">
+              <a:spcBef>
+                <a:spcPts val="0"/>
+              </a:spcBef>
+              <a:spcAft>
+                <a:spcPts val="0"/>
+              </a:spcAft>
+              <a:defRPr/>
+            </a:pPr>
+            <a:r>
+              <a:rPr lang="sv-SE" dirty="0" smtClean="0">
+                <a:solidFill>
+                  <a:schemeClr val="tx1"/>
+                </a:solidFill>
+              </a:rPr>
+              <a:t>B</a:t>
+            </a:r>
+            <a:endParaRPr lang="sv-SE" dirty="0">
+              <a:solidFill>
+                <a:schemeClr val="tx1"/>
+              </a:solidFill>
+            </a:endParaRPr>
+          </a:p>
+        </p:txBody>
+      </p:sp>
+      <p:graphicFrame>
+        <p:nvGraphicFramePr>
+          <p:cNvPr id="2" name="Object 1"/>
+          <p:cNvGraphicFramePr>
+            <a:graphicFrameLocks noChangeAspect="1"/>
+          </p:cNvGraphicFramePr>
+          <p:nvPr>
+            <p:extLst>
+              <p:ext uri="{D42A27DB-BD31-4B8C-83A1-F6EECF244321}">
+                <p14:modId xmlns:p14="http://schemas.microsoft.com/office/powerpoint/2010/main" val="2278928986"/>
+              </p:ext>
+            </p:extLst>
+          </p:nvPr>
+        </p:nvGraphicFramePr>
+        <p:xfrm>
+          <a:off x="2173921" y="2885582"/>
+          <a:ext cx="1838325" cy="1343025"/>
+        </p:xfrm>
+        <a:graphic>
+          <a:graphicData uri="http://schemas.openxmlformats.org/presentationml/2006/ole">
+            <mc:AlternateContent xmlns:mc="http://schemas.openxmlformats.org/markup-compatibility/2006">
+              <mc:Choice xmlns:v="urn:schemas-microsoft-com:vml" Requires="v">
+                <p:oleObj spid="_x0000_s3092" name="Worksheet" r:id="rId3" imgW="1838255" imgH="1342980" progId="Excel.Sheet.12">
+                  <p:embed/>
+                </p:oleObj>
+              </mc:Choice>
+              <mc:Fallback>
+                <p:oleObj name="Worksheet" r:id="rId3" imgW="1838255" imgH="1342980" progId="Excel.Sheet.12">
+                  <p:embed/>
+                  <p:pic>
+                    <p:nvPicPr>
+                      <p:cNvPr id="0" name="Object 16"/>
+                      <p:cNvPicPr>
+                        <a:picLocks noChangeAspect="1" noChangeArrowheads="1"/>
+                      </p:cNvPicPr>
+                      <p:nvPr/>
+                    </p:nvPicPr>
+                    <p:blipFill>
+                      <a:blip r:embed="rId4"/>
+                      <a:srcRect/>
+                      <a:stretch>
+                        <a:fillRect/>
+                      </a:stretch>
+                    </p:blipFill>
+                    <p:spPr bwMode="auto">
+                      <a:xfrm>
+                        <a:off x="2173921" y="2885582"/>
+                        <a:ext cx="1838325" cy="1343025"/>
+                      </a:xfrm>
+                      <a:prstGeom prst="rect">
+                        <a:avLst/>
+                      </a:prstGeom>
+                      <a:noFill/>
+                      <a:ln>
+                        <a:noFill/>
+                      </a:ln>
+                      <a:effectLst/>
+                      <a:extLst>
+                        <a:ext uri="{909E8E84-426E-40DD-AFC4-6F175D3DCCD1}">
+                          <a14:hiddenFill xmlns:a14="http://schemas.microsoft.com/office/drawing/2010/main">
+                            <a:solidFill>
+                              <a:srgbClr val="FFFFFF"/>
+                            </a:solidFill>
+                          </a14:hiddenFill>
+                        </a:ext>
+                        <a:ext uri="{91240B29-F687-4F45-9708-019B960494DF}">
+                          <a14:hiddenLine xmlns:a14="http://schemas.microsoft.com/office/drawing/2010/main" w="9525">
+                            <a:solidFill>
+                              <a:srgbClr val="000000"/>
+                            </a:solidFill>
+                            <a:miter lim="800000"/>
+                            <a:headEnd/>
+                            <a:tailEnd/>
+                          </a14:hiddenLine>
+                        </a:ext>
+                        <a:ext uri="{AF507438-7753-43E0-B8FC-AC1667EBCBE1}">
+                          <a14:hiddenEffects xmlns:a14="http://schemas.microsoft.com/office/drawing/2010/main">
+                            <a:effectLst>
+                              <a:outerShdw dist="35921" dir="2700000" algn="ctr" rotWithShape="0">
+                                <a:srgbClr val="808080"/>
+                              </a:outerShdw>
+                            </a:effectLst>
+                          </a14:hiddenEffects>
+                        </a:ext>
+                      </a:extLst>
+                    </p:spPr>
+                  </p:pic>
+                </p:oleObj>
+              </mc:Fallback>
+            </mc:AlternateContent>
+          </a:graphicData>
+        </a:graphic>
+      </p:graphicFrame>
+      <p:sp>
+        <p:nvSpPr>
+          <p:cNvPr id="3" name="TextBox 2"/>
+          <p:cNvSpPr txBox="1"/>
+          <p:nvPr/>
+        </p:nvSpPr>
+        <p:spPr>
+          <a:xfrm>
+            <a:off x="2488184" y="1663226"/>
+            <a:ext cx="308098" cy="369332"/>
           </a:xfrm>
           <a:prstGeom prst="rect">
             <a:avLst/>
@@ -3847,7 +4114,160 @@
           <a:p>
             <a:r>
               <a:rPr lang="sv-SE" dirty="0" smtClean="0"/>
-              <a:t>1.2 Relationsobjekt (”Många till många”)</a:t>
+              <a:t>C</a:t>
+            </a:r>
+            <a:endParaRPr lang="sv-SE" dirty="0"/>
+          </a:p>
+        </p:txBody>
+      </p:sp>
+      <p:sp>
+        <p:nvSpPr>
+          <p:cNvPr id="4" name="TextBox 3"/>
+          <p:cNvSpPr txBox="1"/>
+          <p:nvPr/>
+        </p:nvSpPr>
+        <p:spPr>
+          <a:xfrm>
+            <a:off x="1418146" y="2964105"/>
+            <a:ext cx="432047" cy="369332"/>
+          </a:xfrm>
+          <a:prstGeom prst="rect">
+            <a:avLst/>
+          </a:prstGeom>
+          <a:noFill/>
+        </p:spPr>
+        <p:txBody>
+          <a:bodyPr wrap="square" rtlCol="0">
+            <a:spAutoFit/>
+          </a:bodyPr>
+          <a:lstStyle/>
+          <a:p>
+            <a:r>
+              <a:rPr lang="sv-SE" dirty="0" smtClean="0"/>
+              <a:t>C:</a:t>
+            </a:r>
+            <a:endParaRPr lang="sv-SE" dirty="0"/>
+          </a:p>
+        </p:txBody>
+      </p:sp>
+      <p:graphicFrame>
+        <p:nvGraphicFramePr>
+          <p:cNvPr id="6" name="Object 5"/>
+          <p:cNvGraphicFramePr>
+            <a:graphicFrameLocks noChangeAspect="1"/>
+          </p:cNvGraphicFramePr>
+          <p:nvPr>
+            <p:extLst>
+              <p:ext uri="{D42A27DB-BD31-4B8C-83A1-F6EECF244321}">
+                <p14:modId xmlns:p14="http://schemas.microsoft.com/office/powerpoint/2010/main" val="768169125"/>
+              </p:ext>
+            </p:extLst>
+          </p:nvPr>
+        </p:nvGraphicFramePr>
+        <p:xfrm>
+          <a:off x="6084168" y="2964105"/>
+          <a:ext cx="1838325" cy="1343025"/>
+        </p:xfrm>
+        <a:graphic>
+          <a:graphicData uri="http://schemas.openxmlformats.org/presentationml/2006/ole">
+            <mc:AlternateContent xmlns:mc="http://schemas.openxmlformats.org/markup-compatibility/2006">
+              <mc:Choice xmlns:v="urn:schemas-microsoft-com:vml" Requires="v">
+                <p:oleObj spid="_x0000_s3093" name="Worksheet" r:id="rId5" imgW="1838255" imgH="1342980" progId="Excel.Sheet.12">
+                  <p:embed/>
+                </p:oleObj>
+              </mc:Choice>
+              <mc:Fallback>
+                <p:oleObj name="Worksheet" r:id="rId5" imgW="1838255" imgH="1342980" progId="Excel.Sheet.12">
+                  <p:embed/>
+                  <p:pic>
+                    <p:nvPicPr>
+                      <p:cNvPr id="0" name="Object 1"/>
+                      <p:cNvPicPr>
+                        <a:picLocks noChangeAspect="1" noChangeArrowheads="1"/>
+                      </p:cNvPicPr>
+                      <p:nvPr/>
+                    </p:nvPicPr>
+                    <p:blipFill>
+                      <a:blip r:embed="rId6"/>
+                      <a:srcRect/>
+                      <a:stretch>
+                        <a:fillRect/>
+                      </a:stretch>
+                    </p:blipFill>
+                    <p:spPr bwMode="auto">
+                      <a:xfrm>
+                        <a:off x="6084168" y="2964105"/>
+                        <a:ext cx="1838325" cy="1343025"/>
+                      </a:xfrm>
+                      <a:prstGeom prst="rect">
+                        <a:avLst/>
+                      </a:prstGeom>
+                      <a:noFill/>
+                      <a:ln>
+                        <a:noFill/>
+                      </a:ln>
+                      <a:effectLst/>
+                      <a:extLst>
+                        <a:ext uri="{909E8E84-426E-40DD-AFC4-6F175D3DCCD1}">
+                          <a14:hiddenFill xmlns:a14="http://schemas.microsoft.com/office/drawing/2010/main">
+                            <a:solidFill>
+                              <a:srgbClr val="FFFFFF"/>
+                            </a:solidFill>
+                          </a14:hiddenFill>
+                        </a:ext>
+                        <a:ext uri="{91240B29-F687-4F45-9708-019B960494DF}">
+                          <a14:hiddenLine xmlns:a14="http://schemas.microsoft.com/office/drawing/2010/main" w="9525">
+                            <a:solidFill>
+                              <a:srgbClr val="000000"/>
+                            </a:solidFill>
+                            <a:miter lim="800000"/>
+                            <a:headEnd/>
+                            <a:tailEnd/>
+                          </a14:hiddenLine>
+                        </a:ext>
+                        <a:ext uri="{AF507438-7753-43E0-B8FC-AC1667EBCBE1}">
+                          <a14:hiddenEffects xmlns:a14="http://schemas.microsoft.com/office/drawing/2010/main">
+                            <a:effectLst>
+                              <a:outerShdw dist="35921" dir="2700000" algn="ctr" rotWithShape="0">
+                                <a:srgbClr val="808080"/>
+                              </a:outerShdw>
+                            </a:effectLst>
+                          </a14:hiddenEffects>
+                        </a:ext>
+                      </a:extLst>
+                    </p:spPr>
+                  </p:pic>
+                </p:oleObj>
+              </mc:Fallback>
+            </mc:AlternateContent>
+          </a:graphicData>
+        </a:graphic>
+      </p:graphicFrame>
+      <p:sp>
+        <p:nvSpPr>
+          <p:cNvPr id="19" name="TextBox 18"/>
+          <p:cNvSpPr txBox="1"/>
+          <p:nvPr/>
+        </p:nvSpPr>
+        <p:spPr>
+          <a:xfrm>
+            <a:off x="4960321" y="2964105"/>
+            <a:ext cx="432047" cy="369332"/>
+          </a:xfrm>
+          <a:prstGeom prst="rect">
+            <a:avLst/>
+          </a:prstGeom>
+          <a:noFill/>
+        </p:spPr>
+        <p:txBody>
+          <a:bodyPr wrap="square" rtlCol="0">
+            <a:spAutoFit/>
+          </a:bodyPr>
+          <a:lstStyle/>
+          <a:p>
+            <a:r>
+              <a:rPr lang="sv-SE" dirty="0" smtClean="0"/>
+              <a:t>B:</a:t>
             </a:r>
             <a:endParaRPr lang="sv-SE" dirty="0"/>
           </a:p>
@@ -3891,7 +4311,7 @@
         </p:nvSpPr>
         <p:spPr>
           <a:xfrm>
-            <a:off x="3635896" y="1408361"/>
+            <a:off x="1345236" y="2204864"/>
             <a:ext cx="936625" cy="503238"/>
           </a:xfrm>
           <a:prstGeom prst="rect">
@@ -3933,6 +4353,14 @@
               </a:spcAft>
               <a:defRPr/>
             </a:pPr>
+            <a:r>
+              <a:rPr lang="sv-SE" dirty="0" smtClean="0">
+                <a:solidFill>
+                  <a:schemeClr val="tx1"/>
+                </a:solidFill>
+              </a:rPr>
+              <a:t>A</a:t>
+            </a:r>
             <a:endParaRPr lang="sv-SE" dirty="0">
               <a:solidFill>
                 <a:schemeClr val="tx1"/>
@@ -3951,7 +4379,535 @@
         </p:nvGrpSpPr>
         <p:grpSpPr bwMode="auto">
           <a:xfrm>
-            <a:off x="1331640" y="1371055"/>
+            <a:off x="2280440" y="2312020"/>
+            <a:ext cx="936625" cy="288925"/>
+            <a:chOff x="2555776" y="692696"/>
+            <a:chExt cx="936104" cy="288032"/>
+          </a:xfrm>
+        </p:grpSpPr>
+        <p:cxnSp>
+          <p:nvCxnSpPr>
+            <p:cNvPr id="6" name="Rak 5"/>
+            <p:cNvCxnSpPr/>
+            <p:nvPr/>
+          </p:nvCxnSpPr>
+          <p:spPr>
+            <a:xfrm>
+              <a:off x="2555776" y="836712"/>
+              <a:ext cx="936104" cy="0"/>
+            </a:xfrm>
+            <a:prstGeom prst="line">
+              <a:avLst/>
+            </a:prstGeom>
+            <a:ln w="9525">
+              <a:solidFill>
+                <a:schemeClr val="tx1"/>
+              </a:solidFill>
+            </a:ln>
+          </p:spPr>
+          <p:style>
+            <a:lnRef idx="1">
+              <a:schemeClr val="accent1"/>
+            </a:lnRef>
+            <a:fillRef idx="0">
+              <a:schemeClr val="accent1"/>
+            </a:fillRef>
+            <a:effectRef idx="0">
+              <a:schemeClr val="accent1"/>
+            </a:effectRef>
+            <a:fontRef idx="minor">
+              <a:schemeClr val="tx1"/>
+            </a:fontRef>
+          </p:style>
+        </p:cxnSp>
+        <p:sp>
+          <p:nvSpPr>
+            <p:cNvPr id="7" name="Rektangel 6"/>
+            <p:cNvSpPr/>
+            <p:nvPr/>
+          </p:nvSpPr>
+          <p:spPr>
+            <a:xfrm>
+              <a:off x="3420483" y="692696"/>
+              <a:ext cx="71397" cy="288032"/>
+            </a:xfrm>
+            <a:prstGeom prst="rect">
+              <a:avLst/>
+            </a:prstGeom>
+            <a:noFill/>
+            <a:ln w="9525">
+              <a:solidFill>
+                <a:schemeClr val="tx1"/>
+              </a:solidFill>
+            </a:ln>
+          </p:spPr>
+          <p:style>
+            <a:lnRef idx="2">
+              <a:schemeClr val="accent1">
+                <a:shade val="50000"/>
+              </a:schemeClr>
+            </a:lnRef>
+            <a:fillRef idx="1">
+              <a:schemeClr val="accent1"/>
+            </a:fillRef>
+            <a:effectRef idx="0">
+              <a:schemeClr val="accent1"/>
+            </a:effectRef>
+            <a:fontRef idx="minor">
+              <a:schemeClr val="lt1"/>
+            </a:fontRef>
+          </p:style>
+          <p:txBody>
+            <a:bodyPr anchor="ctr"/>
+            <a:lstStyle/>
+            <a:p>
+              <a:pPr algn="ctr" fontAlgn="auto">
+                <a:spcBef>
+                  <a:spcPts val="0"/>
+                </a:spcBef>
+                <a:spcAft>
+                  <a:spcPts val="0"/>
+                </a:spcAft>
+                <a:defRPr/>
+              </a:pPr>
+              <a:endParaRPr lang="sv-SE"/>
+            </a:p>
+          </p:txBody>
+        </p:sp>
+      </p:grpSp>
+      <p:sp>
+        <p:nvSpPr>
+          <p:cNvPr id="16" name="TextBox 15"/>
+          <p:cNvSpPr txBox="1"/>
+          <p:nvPr/>
+        </p:nvSpPr>
+        <p:spPr>
+          <a:xfrm>
+            <a:off x="1187624" y="548680"/>
+            <a:ext cx="1736886" cy="369332"/>
+          </a:xfrm>
+          <a:prstGeom prst="rect">
+            <a:avLst/>
+          </a:prstGeom>
+        </p:spPr>
+        <p:style>
+          <a:lnRef idx="1">
+            <a:schemeClr val="accent1"/>
+          </a:lnRef>
+          <a:fillRef idx="2">
+            <a:schemeClr val="accent1"/>
+          </a:fillRef>
+          <a:effectRef idx="1">
+            <a:schemeClr val="accent1"/>
+          </a:effectRef>
+          <a:fontRef idx="minor">
+            <a:schemeClr val="dk1"/>
+          </a:fontRef>
+        </p:style>
+        <p:txBody>
+          <a:bodyPr wrap="none" rtlCol="0">
+            <a:spAutoFit/>
+          </a:bodyPr>
+          <a:lstStyle/>
+          <a:p>
+            <a:r>
+              <a:rPr lang="sv-SE" dirty="0" smtClean="0"/>
+              <a:t>1.3 En till många</a:t>
+            </a:r>
+            <a:endParaRPr lang="sv-SE" dirty="0"/>
+          </a:p>
+        </p:txBody>
+      </p:sp>
+      <p:sp>
+        <p:nvSpPr>
+          <p:cNvPr id="17" name="Rektangel 3"/>
+          <p:cNvSpPr/>
+          <p:nvPr/>
+        </p:nvSpPr>
+        <p:spPr>
+          <a:xfrm>
+            <a:off x="3217065" y="2204864"/>
+            <a:ext cx="936625" cy="503238"/>
+          </a:xfrm>
+          <a:prstGeom prst="rect">
+            <a:avLst/>
+          </a:prstGeom>
+          <a:noFill/>
+          <a:ln>
+            <a:solidFill>
+              <a:schemeClr val="tx1"/>
+            </a:solidFill>
+          </a:ln>
+        </p:spPr>
+        <p:style>
+          <a:lnRef idx="2">
+            <a:schemeClr val="accent1">
+              <a:shade val="50000"/>
+            </a:schemeClr>
+          </a:lnRef>
+          <a:fillRef idx="1">
+            <a:schemeClr val="accent1"/>
+          </a:fillRef>
+          <a:effectRef idx="0">
+            <a:schemeClr val="accent1"/>
+          </a:effectRef>
+          <a:fontRef idx="minor">
+            <a:schemeClr val="lt1"/>
+          </a:fontRef>
+        </p:style>
+        <p:txBody>
+          <a:bodyPr anchor="ctr"/>
+          <a:lstStyle/>
+          <a:p>
+            <a:pPr algn="ctr" fontAlgn="auto">
+              <a:spcBef>
+                <a:spcPts val="0"/>
+              </a:spcBef>
+              <a:spcAft>
+                <a:spcPts val="0"/>
+              </a:spcAft>
+              <a:defRPr/>
+            </a:pPr>
+            <a:r>
+              <a:rPr lang="sv-SE" dirty="0" smtClean="0">
+                <a:solidFill>
+                  <a:schemeClr val="tx1"/>
+                </a:solidFill>
+              </a:rPr>
+              <a:t>B</a:t>
+            </a:r>
+            <a:endParaRPr lang="sv-SE" dirty="0">
+              <a:solidFill>
+                <a:schemeClr val="tx1"/>
+              </a:solidFill>
+            </a:endParaRPr>
+          </a:p>
+        </p:txBody>
+      </p:sp>
+      <p:graphicFrame>
+        <p:nvGraphicFramePr>
+          <p:cNvPr id="2" name="Object 1"/>
+          <p:cNvGraphicFramePr>
+            <a:graphicFrameLocks noChangeAspect="1"/>
+          </p:cNvGraphicFramePr>
+          <p:nvPr>
+            <p:extLst>
+              <p:ext uri="{D42A27DB-BD31-4B8C-83A1-F6EECF244321}">
+                <p14:modId xmlns:p14="http://schemas.microsoft.com/office/powerpoint/2010/main" val="327101617"/>
+              </p:ext>
+            </p:extLst>
+          </p:nvPr>
+        </p:nvGraphicFramePr>
+        <p:xfrm>
+          <a:off x="1988505" y="2949333"/>
+          <a:ext cx="1872009" cy="1343025"/>
+        </p:xfrm>
+        <a:graphic>
+          <a:graphicData uri="http://schemas.openxmlformats.org/presentationml/2006/ole">
+            <mc:AlternateContent xmlns:mc="http://schemas.openxmlformats.org/markup-compatibility/2006">
+              <mc:Choice xmlns:v="urn:schemas-microsoft-com:vml" Requires="v">
+                <p:oleObj spid="_x0000_s4115" name="Worksheet" r:id="rId3" imgW="1838255" imgH="1342980" progId="Excel.Sheet.12">
+                  <p:embed/>
+                </p:oleObj>
+              </mc:Choice>
+              <mc:Fallback>
+                <p:oleObj name="Worksheet" r:id="rId3" imgW="1838255" imgH="1342980" progId="Excel.Sheet.12">
+                  <p:embed/>
+                  <p:pic>
+                    <p:nvPicPr>
+                      <p:cNvPr id="0" name="Object 1"/>
+                      <p:cNvPicPr>
+                        <a:picLocks noChangeAspect="1" noChangeArrowheads="1"/>
+                      </p:cNvPicPr>
+                      <p:nvPr/>
+                    </p:nvPicPr>
+                    <p:blipFill>
+                      <a:blip r:embed="rId4"/>
+                      <a:srcRect/>
+                      <a:stretch>
+                        <a:fillRect/>
+                      </a:stretch>
+                    </p:blipFill>
+                    <p:spPr bwMode="auto">
+                      <a:xfrm>
+                        <a:off x="1988505" y="2949333"/>
+                        <a:ext cx="1872009" cy="1343025"/>
+                      </a:xfrm>
+                      <a:prstGeom prst="rect">
+                        <a:avLst/>
+                      </a:prstGeom>
+                      <a:noFill/>
+                      <a:ln>
+                        <a:noFill/>
+                      </a:ln>
+                      <a:effectLst/>
+                      <a:extLst/>
+                    </p:spPr>
+                  </p:pic>
+                </p:oleObj>
+              </mc:Fallback>
+            </mc:AlternateContent>
+          </a:graphicData>
+        </a:graphic>
+      </p:graphicFrame>
+      <p:sp>
+        <p:nvSpPr>
+          <p:cNvPr id="9" name="TextBox 8"/>
+          <p:cNvSpPr txBox="1"/>
+          <p:nvPr/>
+        </p:nvSpPr>
+        <p:spPr>
+          <a:xfrm>
+            <a:off x="1418146" y="2964105"/>
+            <a:ext cx="432047" cy="369332"/>
+          </a:xfrm>
+          <a:prstGeom prst="rect">
+            <a:avLst/>
+          </a:prstGeom>
+          <a:noFill/>
+        </p:spPr>
+        <p:txBody>
+          <a:bodyPr wrap="square" rtlCol="0">
+            <a:spAutoFit/>
+          </a:bodyPr>
+          <a:lstStyle/>
+          <a:p>
+            <a:r>
+              <a:rPr lang="sv-SE" dirty="0"/>
+              <a:t>A</a:t>
+            </a:r>
+            <a:r>
+              <a:rPr lang="sv-SE" dirty="0" smtClean="0"/>
+              <a:t>:</a:t>
+            </a:r>
+            <a:endParaRPr lang="sv-SE" dirty="0"/>
+          </a:p>
+        </p:txBody>
+      </p:sp>
+      <p:sp>
+        <p:nvSpPr>
+          <p:cNvPr id="10" name="TextBox 9"/>
+          <p:cNvSpPr txBox="1"/>
+          <p:nvPr/>
+        </p:nvSpPr>
+        <p:spPr>
+          <a:xfrm>
+            <a:off x="4716016" y="2964105"/>
+            <a:ext cx="432047" cy="369332"/>
+          </a:xfrm>
+          <a:prstGeom prst="rect">
+            <a:avLst/>
+          </a:prstGeom>
+          <a:noFill/>
+        </p:spPr>
+        <p:txBody>
+          <a:bodyPr wrap="square" rtlCol="0">
+            <a:spAutoFit/>
+          </a:bodyPr>
+          <a:lstStyle/>
+          <a:p>
+            <a:r>
+              <a:rPr lang="sv-SE" dirty="0"/>
+              <a:t>B</a:t>
+            </a:r>
+            <a:r>
+              <a:rPr lang="sv-SE" dirty="0" smtClean="0"/>
+              <a:t>:</a:t>
+            </a:r>
+            <a:endParaRPr lang="sv-SE" dirty="0"/>
+          </a:p>
+        </p:txBody>
+      </p:sp>
+      <p:graphicFrame>
+        <p:nvGraphicFramePr>
+          <p:cNvPr id="3" name="Object 2"/>
+          <p:cNvGraphicFramePr>
+            <a:graphicFrameLocks noChangeAspect="1"/>
+          </p:cNvGraphicFramePr>
+          <p:nvPr>
+            <p:extLst>
+              <p:ext uri="{D42A27DB-BD31-4B8C-83A1-F6EECF244321}">
+                <p14:modId xmlns:p14="http://schemas.microsoft.com/office/powerpoint/2010/main" val="2172825196"/>
+              </p:ext>
+            </p:extLst>
+          </p:nvPr>
+        </p:nvGraphicFramePr>
+        <p:xfrm>
+          <a:off x="5148063" y="2964105"/>
+          <a:ext cx="1871662" cy="1343025"/>
+        </p:xfrm>
+        <a:graphic>
+          <a:graphicData uri="http://schemas.openxmlformats.org/presentationml/2006/ole">
+            <mc:AlternateContent xmlns:mc="http://schemas.openxmlformats.org/markup-compatibility/2006">
+              <mc:Choice xmlns:v="urn:schemas-microsoft-com:vml" Requires="v">
+                <p:oleObj spid="_x0000_s4116" name="Worksheet" r:id="rId5" imgW="1838255" imgH="1342980" progId="Excel.Sheet.12">
+                  <p:embed/>
+                </p:oleObj>
+              </mc:Choice>
+              <mc:Fallback>
+                <p:oleObj name="Worksheet" r:id="rId5" imgW="1838255" imgH="1342980" progId="Excel.Sheet.12">
+                  <p:embed/>
+                  <p:pic>
+                    <p:nvPicPr>
+                      <p:cNvPr id="0" name="Object 1"/>
+                      <p:cNvPicPr>
+                        <a:picLocks noChangeAspect="1" noChangeArrowheads="1"/>
+                      </p:cNvPicPr>
+                      <p:nvPr/>
+                    </p:nvPicPr>
+                    <p:blipFill>
+                      <a:blip r:embed="rId6"/>
+                      <a:srcRect/>
+                      <a:stretch>
+                        <a:fillRect/>
+                      </a:stretch>
+                    </p:blipFill>
+                    <p:spPr bwMode="auto">
+                      <a:xfrm>
+                        <a:off x="5148063" y="2964105"/>
+                        <a:ext cx="1871662" cy="1343025"/>
+                      </a:xfrm>
+                      <a:prstGeom prst="rect">
+                        <a:avLst/>
+                      </a:prstGeom>
+                      <a:noFill/>
+                      <a:ln>
+                        <a:noFill/>
+                      </a:ln>
+                      <a:extLst>
+                        <a:ext uri="{909E8E84-426E-40DD-AFC4-6F175D3DCCD1}">
+                          <a14:hiddenFill xmlns:a14="http://schemas.microsoft.com/office/drawing/2010/main">
+                            <a:solidFill>
+                              <a:srgbClr val="FFFFFF"/>
+                            </a:solidFill>
+                          </a14:hiddenFill>
+                        </a:ext>
+                        <a:ext uri="{91240B29-F687-4F45-9708-019B960494DF}">
+                          <a14:hiddenLine xmlns:a14="http://schemas.microsoft.com/office/drawing/2010/main" w="9525">
+                            <a:solidFill>
+                              <a:srgbClr val="000000"/>
+                            </a:solidFill>
+                            <a:miter lim="800000"/>
+                            <a:headEnd/>
+                            <a:tailEnd/>
+                          </a14:hiddenLine>
+                        </a:ext>
+                      </a:extLst>
+                    </p:spPr>
+                  </p:pic>
+                </p:oleObj>
+              </mc:Fallback>
+            </mc:AlternateContent>
+          </a:graphicData>
+        </a:graphic>
+      </p:graphicFrame>
+    </p:spTree>
+    <p:extLst>
+      <p:ext uri="{BB962C8B-B14F-4D97-AF65-F5344CB8AC3E}">
+        <p14:creationId xmlns:p14="http://schemas.microsoft.com/office/powerpoint/2010/main" val="3052811900"/>
+      </p:ext>
+    </p:extLst>
+  </p:cSld>
+  <p:clrMapOvr>
+    <a:masterClrMapping/>
+  </p:clrMapOvr>
+</p:sld>
+</file>
+
+<file path=ppt/slides/slide5.xml><?xml version="1.0" encoding="utf-8"?>
+<p:sld xmlns:a="http://schemas.openxmlformats.org/drawingml/2006/main" xmlns:r="http://schemas.openxmlformats.org/officeDocument/2006/relationships" xmlns:p="http://schemas.openxmlformats.org/presentationml/2006/main">
+  <p:cSld>
+    <p:spTree>
+      <p:nvGrpSpPr>
+        <p:cNvPr id="1" name=""/>
+        <p:cNvGrpSpPr/>
+        <p:nvPr/>
+      </p:nvGrpSpPr>
+      <p:grpSpPr>
+        <a:xfrm>
+          <a:off x="0" y="0"/>
+          <a:ext cx="0" cy="0"/>
+          <a:chOff x="0" y="0"/>
+          <a:chExt cx="0" cy="0"/>
+        </a:xfrm>
+      </p:grpSpPr>
+      <p:sp>
+        <p:nvSpPr>
+          <p:cNvPr id="4" name="Rektangel 3"/>
+          <p:cNvSpPr/>
+          <p:nvPr/>
+        </p:nvSpPr>
+        <p:spPr>
+          <a:xfrm>
+            <a:off x="2888029" y="2594018"/>
+            <a:ext cx="936625" cy="503238"/>
+          </a:xfrm>
+          <a:prstGeom prst="rect">
+            <a:avLst/>
+          </a:prstGeom>
+          <a:noFill/>
+          <a:ln>
+            <a:solidFill>
+              <a:schemeClr val="tx1"/>
+            </a:solidFill>
+          </a:ln>
+        </p:spPr>
+        <p:style>
+          <a:lnRef idx="2">
+            <a:schemeClr val="accent1">
+              <a:shade val="50000"/>
+            </a:schemeClr>
+          </a:lnRef>
+          <a:fillRef idx="1">
+            <a:schemeClr val="accent1"/>
+          </a:fillRef>
+          <a:effectRef idx="0">
+            <a:schemeClr val="accent1"/>
+          </a:effectRef>
+          <a:fontRef idx="minor">
+            <a:schemeClr val="lt1"/>
+          </a:fontRef>
+        </p:style>
+        <p:txBody>
+          <a:bodyPr anchor="ctr"/>
+          <a:lstStyle/>
+          <a:p>
+            <a:pPr algn="ctr" fontAlgn="auto">
+              <a:spcBef>
+                <a:spcPts val="0"/>
+              </a:spcBef>
+              <a:spcAft>
+                <a:spcPts val="0"/>
+              </a:spcAft>
+              <a:defRPr/>
+            </a:pPr>
+            <a:r>
+              <a:rPr lang="sv-SE" dirty="0" smtClean="0">
+                <a:solidFill>
+                  <a:schemeClr val="tx1"/>
+                </a:solidFill>
+              </a:rPr>
+              <a:t>C</a:t>
+            </a:r>
+            <a:endParaRPr lang="sv-SE" dirty="0">
+              <a:solidFill>
+                <a:schemeClr val="tx1"/>
+              </a:solidFill>
+            </a:endParaRPr>
+          </a:p>
+        </p:txBody>
+      </p:sp>
+      <p:grpSp>
+        <p:nvGrpSpPr>
+          <p:cNvPr id="5" name="Grupp 7"/>
+          <p:cNvGrpSpPr>
+            <a:grpSpLocks/>
+          </p:cNvGrpSpPr>
+          <p:nvPr/>
+        </p:nvGrpSpPr>
+        <p:grpSpPr bwMode="auto">
+          <a:xfrm rot="5400000">
+            <a:off x="1340024" y="3320132"/>
             <a:ext cx="936625" cy="288925"/>
             <a:chOff x="2555776" y="692696"/>
             <a:chExt cx="936104" cy="288032"/>
@@ -4057,7 +5013,7 @@
         </p:nvGrpSpPr>
         <p:grpSpPr bwMode="auto">
           <a:xfrm>
-            <a:off x="4842917" y="1556792"/>
+            <a:off x="1808529" y="2662830"/>
             <a:ext cx="1079500" cy="288925"/>
             <a:chOff x="4499992" y="692696"/>
             <a:chExt cx="1080120" cy="288032"/>
@@ -4341,13 +5297,26 @@
         <p:spPr>
           <a:xfrm>
             <a:off x="1187624" y="548680"/>
-            <a:ext cx="1736886" cy="369332"/>
+            <a:ext cx="4036554" cy="369332"/>
           </a:xfrm>
           <a:prstGeom prst="rect">
             <a:avLst/>
           </a:prstGeom>
-          <a:noFill/>
         </p:spPr>
+        <p:style>
+          <a:lnRef idx="1">
+            <a:schemeClr val="accent1"/>
+          </a:lnRef>
+          <a:fillRef idx="2">
+            <a:schemeClr val="accent1"/>
+          </a:fillRef>
+          <a:effectRef idx="1">
+            <a:schemeClr val="accent1"/>
+          </a:effectRef>
+          <a:fontRef idx="minor">
+            <a:schemeClr val="dk1"/>
+          </a:fontRef>
+        </p:style>
         <p:txBody>
           <a:bodyPr wrap="none" rtlCol="0">
             <a:spAutoFit/>
@@ -4356,51 +5325,21 @@
           <a:p>
             <a:r>
               <a:rPr lang="sv-SE" dirty="0" smtClean="0"/>
-              <a:t>1.3 En till många</a:t>
+              <a:t>1.4 Många till många mellan flera objekt</a:t>
             </a:r>
             <a:endParaRPr lang="sv-SE" dirty="0"/>
           </a:p>
         </p:txBody>
       </p:sp>
-    </p:spTree>
-    <p:extLst>
-      <p:ext uri="{BB962C8B-B14F-4D97-AF65-F5344CB8AC3E}">
-        <p14:creationId xmlns:p14="http://schemas.microsoft.com/office/powerpoint/2010/main" val="3052811900"/>
-      </p:ext>
-    </p:extLst>
-  </p:cSld>
-  <p:clrMapOvr>
-    <a:masterClrMapping/>
-  </p:clrMapOvr>
-</p:sld>
-</file>
-
-<file path=ppt/slides/slide5.xml><?xml version="1.0" encoding="utf-8"?>
-<p:sld xmlns:a="http://schemas.openxmlformats.org/drawingml/2006/main" xmlns:r="http://schemas.openxmlformats.org/officeDocument/2006/relationships" xmlns:p="http://schemas.openxmlformats.org/presentationml/2006/main">
-  <p:cSld>
-    <p:spTree>
-      <p:nvGrpSpPr>
-        <p:cNvPr id="1" name=""/>
-        <p:cNvGrpSpPr/>
-        <p:nvPr/>
-      </p:nvGrpSpPr>
-      <p:grpSpPr>
-        <a:xfrm>
-          <a:off x="0" y="0"/>
-          <a:ext cx="0" cy="0"/>
-          <a:chOff x="0" y="0"/>
-          <a:chExt cx="0" cy="0"/>
-        </a:xfrm>
-      </p:grpSpPr>
-      <p:sp>
-        <p:nvSpPr>
-          <p:cNvPr id="4" name="Rektangel 3"/>
+      <p:sp>
+        <p:nvSpPr>
+          <p:cNvPr id="17" name="Rektangel 3"/>
           <p:cNvSpPr/>
           <p:nvPr/>
         </p:nvSpPr>
         <p:spPr>
           <a:xfrm>
-            <a:off x="3635896" y="1408361"/>
+            <a:off x="1340024" y="3937986"/>
             <a:ext cx="936625" cy="503238"/>
           </a:xfrm>
           <a:prstGeom prst="rect">
@@ -4442,6 +5381,14 @@
               </a:spcAft>
               <a:defRPr/>
             </a:pPr>
+            <a:r>
+              <a:rPr lang="sv-SE" dirty="0" smtClean="0">
+                <a:solidFill>
+                  <a:schemeClr val="tx1"/>
+                </a:solidFill>
+              </a:rPr>
+              <a:t>B</a:t>
+            </a:r>
             <a:endParaRPr lang="sv-SE" dirty="0">
               <a:solidFill>
                 <a:schemeClr val="tx1"/>
@@ -4450,17 +5397,83 @@
           </a:p>
         </p:txBody>
       </p:sp>
+      <p:sp>
+        <p:nvSpPr>
+          <p:cNvPr id="18" name="Rektangel 3"/>
+          <p:cNvSpPr/>
+          <p:nvPr/>
+        </p:nvSpPr>
+        <p:spPr>
+          <a:xfrm>
+            <a:off x="1311177" y="1701255"/>
+            <a:ext cx="936625" cy="503238"/>
+          </a:xfrm>
+          <a:prstGeom prst="rect">
+            <a:avLst/>
+          </a:prstGeom>
+          <a:noFill/>
+          <a:ln>
+            <a:solidFill>
+              <a:schemeClr val="tx1"/>
+            </a:solidFill>
+          </a:ln>
+        </p:spPr>
+        <p:style>
+          <a:lnRef idx="2">
+            <a:schemeClr val="accent1">
+              <a:shade val="50000"/>
+            </a:schemeClr>
+          </a:lnRef>
+          <a:fillRef idx="1">
+            <a:schemeClr val="accent1"/>
+          </a:fillRef>
+          <a:effectRef idx="0">
+            <a:schemeClr val="accent1"/>
+          </a:effectRef>
+          <a:fontRef idx="minor">
+            <a:schemeClr val="lt1"/>
+          </a:fontRef>
+        </p:style>
+        <p:txBody>
+          <a:bodyPr anchor="ctr"/>
+          <a:lstStyle/>
+          <a:p>
+            <a:pPr algn="ctr" fontAlgn="auto">
+              <a:spcBef>
+                <a:spcPts val="0"/>
+              </a:spcBef>
+              <a:spcAft>
+                <a:spcPts val="0"/>
+              </a:spcAft>
+              <a:defRPr/>
+            </a:pPr>
+            <a:r>
+              <a:rPr lang="sv-SE" dirty="0" smtClean="0">
+                <a:solidFill>
+                  <a:schemeClr val="tx1"/>
+                </a:solidFill>
+              </a:rPr>
+              <a:t>A</a:t>
+            </a:r>
+            <a:endParaRPr lang="sv-SE" dirty="0">
+              <a:solidFill>
+                <a:schemeClr val="tx1"/>
+              </a:solidFill>
+            </a:endParaRPr>
+          </a:p>
+        </p:txBody>
+      </p:sp>
       <p:grpSp>
         <p:nvGrpSpPr>
-          <p:cNvPr id="5" name="Grupp 7"/>
+          <p:cNvPr id="19" name="Grupp 7"/>
           <p:cNvGrpSpPr>
             <a:grpSpLocks/>
           </p:cNvGrpSpPr>
           <p:nvPr/>
         </p:nvGrpSpPr>
         <p:grpSpPr bwMode="auto">
-          <a:xfrm>
-            <a:off x="1331640" y="1371055"/>
+          <a:xfrm rot="16200000">
+            <a:off x="1340024" y="2528343"/>
             <a:ext cx="936625" cy="288925"/>
             <a:chOff x="2555776" y="692696"/>
             <a:chExt cx="936104" cy="288032"/>
@@ -4468,7 +5481,7 @@
         </p:grpSpPr>
         <p:cxnSp>
           <p:nvCxnSpPr>
-            <p:cNvPr id="6" name="Rak 5"/>
+            <p:cNvPr id="20" name="Rak 5"/>
             <p:cNvCxnSpPr/>
             <p:nvPr/>
           </p:nvCxnSpPr>
@@ -4503,7 +5516,7 @@
         </p:cxnSp>
         <p:sp>
           <p:nvSpPr>
-            <p:cNvPr id="7" name="Rektangel 6"/>
+            <p:cNvPr id="21" name="Rektangel 6"/>
             <p:cNvSpPr/>
             <p:nvPr/>
           </p:nvSpPr>
@@ -4556,6 +5569,358 @@
           </p:txBody>
         </p:sp>
       </p:grpSp>
+      <p:sp>
+        <p:nvSpPr>
+          <p:cNvPr id="2" name="TextBox 1"/>
+          <p:cNvSpPr txBox="1"/>
+          <p:nvPr/>
+        </p:nvSpPr>
+        <p:spPr>
+          <a:xfrm>
+            <a:off x="2198729" y="2469711"/>
+            <a:ext cx="279127" cy="369332"/>
+          </a:xfrm>
+          <a:prstGeom prst="rect">
+            <a:avLst/>
+          </a:prstGeom>
+          <a:noFill/>
+        </p:spPr>
+        <p:txBody>
+          <a:bodyPr wrap="square" rtlCol="0">
+            <a:spAutoFit/>
+          </a:bodyPr>
+          <a:lstStyle/>
+          <a:p>
+            <a:r>
+              <a:rPr lang="sv-SE" dirty="0" smtClean="0"/>
+              <a:t>D</a:t>
+            </a:r>
+            <a:endParaRPr lang="sv-SE" dirty="0"/>
+          </a:p>
+        </p:txBody>
+      </p:sp>
+      <p:graphicFrame>
+        <p:nvGraphicFramePr>
+          <p:cNvPr id="3" name="Object 2"/>
+          <p:cNvGraphicFramePr>
+            <a:graphicFrameLocks noChangeAspect="1"/>
+          </p:cNvGraphicFramePr>
+          <p:nvPr>
+            <p:extLst>
+              <p:ext uri="{D42A27DB-BD31-4B8C-83A1-F6EECF244321}">
+                <p14:modId xmlns:p14="http://schemas.microsoft.com/office/powerpoint/2010/main" val="1565394564"/>
+              </p:ext>
+            </p:extLst>
+          </p:nvPr>
+        </p:nvGraphicFramePr>
+        <p:xfrm>
+          <a:off x="5076056" y="1608730"/>
+          <a:ext cx="1871662" cy="1343025"/>
+        </p:xfrm>
+        <a:graphic>
+          <a:graphicData uri="http://schemas.openxmlformats.org/presentationml/2006/ole">
+            <mc:AlternateContent xmlns:mc="http://schemas.openxmlformats.org/markup-compatibility/2006">
+              <mc:Choice xmlns:v="urn:schemas-microsoft-com:vml" Requires="v">
+                <p:oleObj spid="_x0000_s5132" name="Worksheet" r:id="rId3" imgW="1838255" imgH="1342980" progId="Excel.Sheet.12">
+                  <p:embed/>
+                </p:oleObj>
+              </mc:Choice>
+              <mc:Fallback>
+                <p:oleObj name="Worksheet" r:id="rId3" imgW="1838255" imgH="1342980" progId="Excel.Sheet.12">
+                  <p:embed/>
+                  <p:pic>
+                    <p:nvPicPr>
+                      <p:cNvPr id="0" name="Object 1"/>
+                      <p:cNvPicPr>
+                        <a:picLocks noChangeAspect="1" noChangeArrowheads="1"/>
+                      </p:cNvPicPr>
+                      <p:nvPr/>
+                    </p:nvPicPr>
+                    <p:blipFill>
+                      <a:blip r:embed="rId4"/>
+                      <a:srcRect/>
+                      <a:stretch>
+                        <a:fillRect/>
+                      </a:stretch>
+                    </p:blipFill>
+                    <p:spPr bwMode="auto">
+                      <a:xfrm>
+                        <a:off x="5076056" y="1608730"/>
+                        <a:ext cx="1871662" cy="1343025"/>
+                      </a:xfrm>
+                      <a:prstGeom prst="rect">
+                        <a:avLst/>
+                      </a:prstGeom>
+                      <a:noFill/>
+                      <a:ln>
+                        <a:noFill/>
+                      </a:ln>
+                      <a:extLst>
+                        <a:ext uri="{909E8E84-426E-40DD-AFC4-6F175D3DCCD1}">
+                          <a14:hiddenFill xmlns:a14="http://schemas.microsoft.com/office/drawing/2010/main">
+                            <a:solidFill>
+                              <a:srgbClr val="FFFFFF"/>
+                            </a:solidFill>
+                          </a14:hiddenFill>
+                        </a:ext>
+                        <a:ext uri="{91240B29-F687-4F45-9708-019B960494DF}">
+                          <a14:hiddenLine xmlns:a14="http://schemas.microsoft.com/office/drawing/2010/main" w="9525">
+                            <a:solidFill>
+                              <a:srgbClr val="000000"/>
+                            </a:solidFill>
+                            <a:miter lim="800000"/>
+                            <a:headEnd/>
+                            <a:tailEnd/>
+                          </a14:hiddenLine>
+                        </a:ext>
+                      </a:extLst>
+                    </p:spPr>
+                  </p:pic>
+                </p:oleObj>
+              </mc:Fallback>
+            </mc:AlternateContent>
+          </a:graphicData>
+        </a:graphic>
+      </p:graphicFrame>
+      <p:graphicFrame>
+        <p:nvGraphicFramePr>
+          <p:cNvPr id="22" name="Object 21"/>
+          <p:cNvGraphicFramePr>
+            <a:graphicFrameLocks noChangeAspect="1"/>
+          </p:cNvGraphicFramePr>
+          <p:nvPr>
+            <p:extLst>
+              <p:ext uri="{D42A27DB-BD31-4B8C-83A1-F6EECF244321}">
+                <p14:modId xmlns:p14="http://schemas.microsoft.com/office/powerpoint/2010/main" val="1445462740"/>
+              </p:ext>
+            </p:extLst>
+          </p:nvPr>
+        </p:nvGraphicFramePr>
+        <p:xfrm>
+          <a:off x="5076056" y="3518092"/>
+          <a:ext cx="1871662" cy="1343025"/>
+        </p:xfrm>
+        <a:graphic>
+          <a:graphicData uri="http://schemas.openxmlformats.org/presentationml/2006/ole">
+            <mc:AlternateContent xmlns:mc="http://schemas.openxmlformats.org/markup-compatibility/2006">
+              <mc:Choice xmlns:v="urn:schemas-microsoft-com:vml" Requires="v">
+                <p:oleObj spid="_x0000_s5133" name="Worksheet" r:id="rId5" imgW="1838255" imgH="1342980" progId="Excel.Sheet.12">
+                  <p:embed/>
+                </p:oleObj>
+              </mc:Choice>
+              <mc:Fallback>
+                <p:oleObj name="Worksheet" r:id="rId5" imgW="1838255" imgH="1342980" progId="Excel.Sheet.12">
+                  <p:embed/>
+                  <p:pic>
+                    <p:nvPicPr>
+                      <p:cNvPr id="0" name="Object 1"/>
+                      <p:cNvPicPr>
+                        <a:picLocks noChangeAspect="1" noChangeArrowheads="1"/>
+                      </p:cNvPicPr>
+                      <p:nvPr/>
+                    </p:nvPicPr>
+                    <p:blipFill>
+                      <a:blip r:embed="rId6"/>
+                      <a:srcRect/>
+                      <a:stretch>
+                        <a:fillRect/>
+                      </a:stretch>
+                    </p:blipFill>
+                    <p:spPr bwMode="auto">
+                      <a:xfrm>
+                        <a:off x="5076056" y="3518092"/>
+                        <a:ext cx="1871662" cy="1343025"/>
+                      </a:xfrm>
+                      <a:prstGeom prst="rect">
+                        <a:avLst/>
+                      </a:prstGeom>
+                      <a:noFill/>
+                      <a:ln>
+                        <a:noFill/>
+                      </a:ln>
+                      <a:extLst>
+                        <a:ext uri="{909E8E84-426E-40DD-AFC4-6F175D3DCCD1}">
+                          <a14:hiddenFill xmlns:a14="http://schemas.microsoft.com/office/drawing/2010/main">
+                            <a:solidFill>
+                              <a:srgbClr val="FFFFFF"/>
+                            </a:solidFill>
+                          </a14:hiddenFill>
+                        </a:ext>
+                        <a:ext uri="{91240B29-F687-4F45-9708-019B960494DF}">
+                          <a14:hiddenLine xmlns:a14="http://schemas.microsoft.com/office/drawing/2010/main" w="9525">
+                            <a:solidFill>
+                              <a:srgbClr val="000000"/>
+                            </a:solidFill>
+                            <a:miter lim="800000"/>
+                            <a:headEnd/>
+                            <a:tailEnd/>
+                          </a14:hiddenLine>
+                        </a:ext>
+                      </a:extLst>
+                    </p:spPr>
+                  </p:pic>
+                </p:oleObj>
+              </mc:Fallback>
+            </mc:AlternateContent>
+          </a:graphicData>
+        </a:graphic>
+      </p:graphicFrame>
+      <p:sp>
+        <p:nvSpPr>
+          <p:cNvPr id="23" name="TextBox 22"/>
+          <p:cNvSpPr txBox="1"/>
+          <p:nvPr/>
+        </p:nvSpPr>
+        <p:spPr>
+          <a:xfrm>
+            <a:off x="4283968" y="1768208"/>
+            <a:ext cx="432048" cy="369332"/>
+          </a:xfrm>
+          <a:prstGeom prst="rect">
+            <a:avLst/>
+          </a:prstGeom>
+          <a:noFill/>
+        </p:spPr>
+        <p:txBody>
+          <a:bodyPr wrap="square" rtlCol="0">
+            <a:spAutoFit/>
+          </a:bodyPr>
+          <a:lstStyle/>
+          <a:p>
+            <a:r>
+              <a:rPr lang="sv-SE" dirty="0" smtClean="0"/>
+              <a:t>C:</a:t>
+            </a:r>
+            <a:endParaRPr lang="sv-SE" dirty="0"/>
+          </a:p>
+        </p:txBody>
+      </p:sp>
+      <p:sp>
+        <p:nvSpPr>
+          <p:cNvPr id="24" name="TextBox 23"/>
+          <p:cNvSpPr txBox="1"/>
+          <p:nvPr/>
+        </p:nvSpPr>
+        <p:spPr>
+          <a:xfrm>
+            <a:off x="4283967" y="3568654"/>
+            <a:ext cx="432049" cy="369332"/>
+          </a:xfrm>
+          <a:prstGeom prst="rect">
+            <a:avLst/>
+          </a:prstGeom>
+          <a:noFill/>
+        </p:spPr>
+        <p:txBody>
+          <a:bodyPr wrap="square" rtlCol="0">
+            <a:spAutoFit/>
+          </a:bodyPr>
+          <a:lstStyle/>
+          <a:p>
+            <a:r>
+              <a:rPr lang="sv-SE" dirty="0" smtClean="0"/>
+              <a:t>D:</a:t>
+            </a:r>
+            <a:endParaRPr lang="sv-SE" dirty="0"/>
+          </a:p>
+        </p:txBody>
+      </p:sp>
+    </p:spTree>
+    <p:extLst>
+      <p:ext uri="{BB962C8B-B14F-4D97-AF65-F5344CB8AC3E}">
+        <p14:creationId xmlns:p14="http://schemas.microsoft.com/office/powerpoint/2010/main" val="56166679"/>
+      </p:ext>
+    </p:extLst>
+  </p:cSld>
+  <p:clrMapOvr>
+    <a:masterClrMapping/>
+  </p:clrMapOvr>
+</p:sld>
+</file>
+
+<file path=ppt/slides/slide6.xml><?xml version="1.0" encoding="utf-8"?>
+<p:sld xmlns:a="http://schemas.openxmlformats.org/drawingml/2006/main" xmlns:r="http://schemas.openxmlformats.org/officeDocument/2006/relationships" xmlns:p="http://schemas.openxmlformats.org/presentationml/2006/main">
+  <p:cSld>
+    <p:spTree>
+      <p:nvGrpSpPr>
+        <p:cNvPr id="1" name=""/>
+        <p:cNvGrpSpPr/>
+        <p:nvPr/>
+      </p:nvGrpSpPr>
+      <p:grpSpPr>
+        <a:xfrm>
+          <a:off x="0" y="0"/>
+          <a:ext cx="0" cy="0"/>
+          <a:chOff x="0" y="0"/>
+          <a:chExt cx="0" cy="0"/>
+        </a:xfrm>
+      </p:grpSpPr>
+      <p:sp>
+        <p:nvSpPr>
+          <p:cNvPr id="4" name="Rektangel 3"/>
+          <p:cNvSpPr/>
+          <p:nvPr/>
+        </p:nvSpPr>
+        <p:spPr>
+          <a:xfrm>
+            <a:off x="1187624" y="1514723"/>
+            <a:ext cx="936625" cy="503238"/>
+          </a:xfrm>
+          <a:prstGeom prst="rect">
+            <a:avLst/>
+          </a:prstGeom>
+          <a:noFill/>
+          <a:ln>
+            <a:solidFill>
+              <a:schemeClr val="tx1"/>
+            </a:solidFill>
+          </a:ln>
+        </p:spPr>
+        <p:style>
+          <a:lnRef idx="2">
+            <a:schemeClr val="accent1">
+              <a:shade val="50000"/>
+            </a:schemeClr>
+          </a:lnRef>
+          <a:fillRef idx="1">
+            <a:schemeClr val="accent1"/>
+          </a:fillRef>
+          <a:effectRef idx="0">
+            <a:schemeClr val="accent1"/>
+          </a:effectRef>
+          <a:fontRef idx="minor">
+            <a:schemeClr val="lt1"/>
+          </a:fontRef>
+        </p:style>
+        <p:txBody>
+          <a:bodyPr anchor="ctr"/>
+          <a:lstStyle/>
+          <a:p>
+            <a:pPr algn="ctr" fontAlgn="auto">
+              <a:spcBef>
+                <a:spcPts val="0"/>
+              </a:spcBef>
+              <a:spcAft>
+                <a:spcPts val="0"/>
+              </a:spcAft>
+              <a:defRPr/>
+            </a:pPr>
+            <a:r>
+              <a:rPr lang="sv-SE" dirty="0" smtClean="0">
+                <a:solidFill>
+                  <a:schemeClr val="tx1"/>
+                </a:solidFill>
+              </a:rPr>
+              <a:t>A</a:t>
+            </a:r>
+            <a:endParaRPr lang="sv-SE" dirty="0">
+              <a:solidFill>
+                <a:schemeClr val="tx1"/>
+              </a:solidFill>
+            </a:endParaRPr>
+          </a:p>
+        </p:txBody>
+      </p:sp>
       <p:grpSp>
         <p:nvGrpSpPr>
           <p:cNvPr id="8" name="Grupp 15"/>
@@ -4566,8 +5931,8 @@
         </p:nvGrpSpPr>
         <p:grpSpPr bwMode="auto">
           <a:xfrm>
-            <a:off x="4842917" y="1556792"/>
-            <a:ext cx="1079500" cy="288925"/>
+            <a:off x="2124248" y="1621879"/>
+            <a:ext cx="1223615" cy="288925"/>
             <a:chOff x="4499992" y="692696"/>
             <a:chExt cx="1080120" cy="288032"/>
           </a:xfrm>
@@ -4850,13 +6215,26 @@
         <p:spPr>
           <a:xfrm>
             <a:off x="1187624" y="548680"/>
-            <a:ext cx="4036554" cy="369332"/>
+            <a:ext cx="3389967" cy="369332"/>
           </a:xfrm>
           <a:prstGeom prst="rect">
             <a:avLst/>
           </a:prstGeom>
-          <a:noFill/>
         </p:spPr>
+        <p:style>
+          <a:lnRef idx="1">
+            <a:schemeClr val="accent1"/>
+          </a:lnRef>
+          <a:fillRef idx="2">
+            <a:schemeClr val="accent1"/>
+          </a:fillRef>
+          <a:effectRef idx="1">
+            <a:schemeClr val="accent1"/>
+          </a:effectRef>
+          <a:fontRef idx="minor">
+            <a:schemeClr val="dk1"/>
+          </a:fontRef>
+        </p:style>
         <p:txBody>
           <a:bodyPr wrap="none" rtlCol="0">
             <a:spAutoFit/>
@@ -4865,51 +6243,21 @@
           <a:p>
             <a:r>
               <a:rPr lang="sv-SE" dirty="0" smtClean="0"/>
-              <a:t>1.4 Många till många mellan flera objekt</a:t>
+              <a:t>1.5 Primärnycklar i relationsobjekt</a:t>
             </a:r>
             <a:endParaRPr lang="sv-SE" dirty="0"/>
           </a:p>
         </p:txBody>
       </p:sp>
-    </p:spTree>
-    <p:extLst>
-      <p:ext uri="{BB962C8B-B14F-4D97-AF65-F5344CB8AC3E}">
-        <p14:creationId xmlns:p14="http://schemas.microsoft.com/office/powerpoint/2010/main" val="56166679"/>
-      </p:ext>
-    </p:extLst>
-  </p:cSld>
-  <p:clrMapOvr>
-    <a:masterClrMapping/>
-  </p:clrMapOvr>
-</p:sld>
-</file>
-
-<file path=ppt/slides/slide6.xml><?xml version="1.0" encoding="utf-8"?>
-<p:sld xmlns:a="http://schemas.openxmlformats.org/drawingml/2006/main" xmlns:r="http://schemas.openxmlformats.org/officeDocument/2006/relationships" xmlns:p="http://schemas.openxmlformats.org/presentationml/2006/main">
-  <p:cSld>
-    <p:spTree>
-      <p:nvGrpSpPr>
-        <p:cNvPr id="1" name=""/>
-        <p:cNvGrpSpPr/>
-        <p:nvPr/>
-      </p:nvGrpSpPr>
-      <p:grpSpPr>
-        <a:xfrm>
-          <a:off x="0" y="0"/>
-          <a:ext cx="0" cy="0"/>
-          <a:chOff x="0" y="0"/>
-          <a:chExt cx="0" cy="0"/>
-        </a:xfrm>
-      </p:grpSpPr>
-      <p:sp>
-        <p:nvSpPr>
-          <p:cNvPr id="4" name="Rektangel 3"/>
+      <p:sp>
+        <p:nvSpPr>
+          <p:cNvPr id="17" name="Rektangel 3"/>
           <p:cNvSpPr/>
           <p:nvPr/>
         </p:nvSpPr>
         <p:spPr>
           <a:xfrm>
-            <a:off x="3635896" y="1408361"/>
+            <a:off x="3347863" y="1509960"/>
             <a:ext cx="936625" cy="503238"/>
           </a:xfrm>
           <a:prstGeom prst="rect">
@@ -4951,6 +6299,14 @@
               </a:spcAft>
               <a:defRPr/>
             </a:pPr>
+            <a:r>
+              <a:rPr lang="sv-SE" dirty="0" smtClean="0">
+                <a:solidFill>
+                  <a:schemeClr val="tx1"/>
+                </a:solidFill>
+              </a:rPr>
+              <a:t>B</a:t>
+            </a:r>
             <a:endParaRPr lang="sv-SE" dirty="0">
               <a:solidFill>
                 <a:schemeClr val="tx1"/>
@@ -4959,25 +6315,289 @@
           </a:p>
         </p:txBody>
       </p:sp>
+      <p:sp>
+        <p:nvSpPr>
+          <p:cNvPr id="18" name="Rektangel 3"/>
+          <p:cNvSpPr/>
+          <p:nvPr/>
+        </p:nvSpPr>
+        <p:spPr>
+          <a:xfrm>
+            <a:off x="771188" y="2918464"/>
+            <a:ext cx="936625" cy="503238"/>
+          </a:xfrm>
+          <a:prstGeom prst="rect">
+            <a:avLst/>
+          </a:prstGeom>
+          <a:noFill/>
+          <a:ln>
+            <a:solidFill>
+              <a:schemeClr val="tx1"/>
+            </a:solidFill>
+          </a:ln>
+        </p:spPr>
+        <p:style>
+          <a:lnRef idx="2">
+            <a:schemeClr val="accent1">
+              <a:shade val="50000"/>
+            </a:schemeClr>
+          </a:lnRef>
+          <a:fillRef idx="1">
+            <a:schemeClr val="accent1"/>
+          </a:fillRef>
+          <a:effectRef idx="0">
+            <a:schemeClr val="accent1"/>
+          </a:effectRef>
+          <a:fontRef idx="minor">
+            <a:schemeClr val="lt1"/>
+          </a:fontRef>
+        </p:style>
+        <p:txBody>
+          <a:bodyPr anchor="ctr"/>
+          <a:lstStyle/>
+          <a:p>
+            <a:pPr algn="ctr" fontAlgn="auto">
+              <a:spcBef>
+                <a:spcPts val="0"/>
+              </a:spcBef>
+              <a:spcAft>
+                <a:spcPts val="0"/>
+              </a:spcAft>
+              <a:defRPr/>
+            </a:pPr>
+            <a:r>
+              <a:rPr lang="sv-SE" dirty="0" smtClean="0">
+                <a:solidFill>
+                  <a:schemeClr val="tx1"/>
+                </a:solidFill>
+              </a:rPr>
+              <a:t>C</a:t>
+            </a:r>
+            <a:endParaRPr lang="sv-SE" dirty="0">
+              <a:solidFill>
+                <a:schemeClr val="tx1"/>
+              </a:solidFill>
+            </a:endParaRPr>
+          </a:p>
+        </p:txBody>
+      </p:sp>
+      <p:sp>
+        <p:nvSpPr>
+          <p:cNvPr id="19" name="Rektangel 3"/>
+          <p:cNvSpPr/>
+          <p:nvPr/>
+        </p:nvSpPr>
+        <p:spPr>
+          <a:xfrm>
+            <a:off x="3820933" y="2506615"/>
+            <a:ext cx="936625" cy="503238"/>
+          </a:xfrm>
+          <a:prstGeom prst="rect">
+            <a:avLst/>
+          </a:prstGeom>
+          <a:noFill/>
+          <a:ln>
+            <a:solidFill>
+              <a:schemeClr val="tx1"/>
+            </a:solidFill>
+          </a:ln>
+        </p:spPr>
+        <p:style>
+          <a:lnRef idx="2">
+            <a:schemeClr val="accent1">
+              <a:shade val="50000"/>
+            </a:schemeClr>
+          </a:lnRef>
+          <a:fillRef idx="1">
+            <a:schemeClr val="accent1"/>
+          </a:fillRef>
+          <a:effectRef idx="0">
+            <a:schemeClr val="accent1"/>
+          </a:effectRef>
+          <a:fontRef idx="minor">
+            <a:schemeClr val="lt1"/>
+          </a:fontRef>
+        </p:style>
+        <p:txBody>
+          <a:bodyPr anchor="ctr"/>
+          <a:lstStyle/>
+          <a:p>
+            <a:pPr algn="ctr" fontAlgn="auto">
+              <a:spcBef>
+                <a:spcPts val="0"/>
+              </a:spcBef>
+              <a:spcAft>
+                <a:spcPts val="0"/>
+              </a:spcAft>
+              <a:defRPr/>
+            </a:pPr>
+            <a:r>
+              <a:rPr lang="sv-SE" dirty="0" smtClean="0">
+                <a:solidFill>
+                  <a:schemeClr val="tx1"/>
+                </a:solidFill>
+              </a:rPr>
+              <a:t>D</a:t>
+            </a:r>
+            <a:endParaRPr lang="sv-SE" dirty="0">
+              <a:solidFill>
+                <a:schemeClr val="tx1"/>
+              </a:solidFill>
+            </a:endParaRPr>
+          </a:p>
+        </p:txBody>
+      </p:sp>
+      <p:sp>
+        <p:nvSpPr>
+          <p:cNvPr id="20" name="Rektangel 3"/>
+          <p:cNvSpPr/>
+          <p:nvPr/>
+        </p:nvSpPr>
+        <p:spPr>
+          <a:xfrm>
+            <a:off x="3726749" y="3463354"/>
+            <a:ext cx="936625" cy="503238"/>
+          </a:xfrm>
+          <a:prstGeom prst="rect">
+            <a:avLst/>
+          </a:prstGeom>
+          <a:noFill/>
+          <a:ln>
+            <a:solidFill>
+              <a:schemeClr val="tx1"/>
+            </a:solidFill>
+          </a:ln>
+        </p:spPr>
+        <p:style>
+          <a:lnRef idx="2">
+            <a:schemeClr val="accent1">
+              <a:shade val="50000"/>
+            </a:schemeClr>
+          </a:lnRef>
+          <a:fillRef idx="1">
+            <a:schemeClr val="accent1"/>
+          </a:fillRef>
+          <a:effectRef idx="0">
+            <a:schemeClr val="accent1"/>
+          </a:effectRef>
+          <a:fontRef idx="minor">
+            <a:schemeClr val="lt1"/>
+          </a:fontRef>
+        </p:style>
+        <p:txBody>
+          <a:bodyPr anchor="ctr"/>
+          <a:lstStyle/>
+          <a:p>
+            <a:pPr algn="ctr" fontAlgn="auto">
+              <a:spcBef>
+                <a:spcPts val="0"/>
+              </a:spcBef>
+              <a:spcAft>
+                <a:spcPts val="0"/>
+              </a:spcAft>
+              <a:defRPr/>
+            </a:pPr>
+            <a:r>
+              <a:rPr lang="sv-SE" dirty="0" smtClean="0">
+                <a:solidFill>
+                  <a:schemeClr val="tx1"/>
+                </a:solidFill>
+              </a:rPr>
+              <a:t>E</a:t>
+            </a:r>
+            <a:endParaRPr lang="sv-SE" dirty="0">
+              <a:solidFill>
+                <a:schemeClr val="tx1"/>
+              </a:solidFill>
+            </a:endParaRPr>
+          </a:p>
+        </p:txBody>
+      </p:sp>
+      <p:sp>
+        <p:nvSpPr>
+          <p:cNvPr id="21" name="Rektangel 3"/>
+          <p:cNvSpPr/>
+          <p:nvPr/>
+        </p:nvSpPr>
+        <p:spPr>
+          <a:xfrm>
+            <a:off x="1991495" y="3900156"/>
+            <a:ext cx="936625" cy="503238"/>
+          </a:xfrm>
+          <a:prstGeom prst="rect">
+            <a:avLst/>
+          </a:prstGeom>
+          <a:noFill/>
+          <a:ln>
+            <a:solidFill>
+              <a:schemeClr val="tx1"/>
+            </a:solidFill>
+          </a:ln>
+        </p:spPr>
+        <p:style>
+          <a:lnRef idx="2">
+            <a:schemeClr val="accent1">
+              <a:shade val="50000"/>
+            </a:schemeClr>
+          </a:lnRef>
+          <a:fillRef idx="1">
+            <a:schemeClr val="accent1"/>
+          </a:fillRef>
+          <a:effectRef idx="0">
+            <a:schemeClr val="accent1"/>
+          </a:effectRef>
+          <a:fontRef idx="minor">
+            <a:schemeClr val="lt1"/>
+          </a:fontRef>
+        </p:style>
+        <p:txBody>
+          <a:bodyPr anchor="ctr"/>
+          <a:lstStyle/>
+          <a:p>
+            <a:pPr algn="ctr" fontAlgn="auto">
+              <a:spcBef>
+                <a:spcPts val="0"/>
+              </a:spcBef>
+              <a:spcAft>
+                <a:spcPts val="0"/>
+              </a:spcAft>
+              <a:defRPr/>
+            </a:pPr>
+            <a:r>
+              <a:rPr lang="sv-SE" dirty="0" smtClean="0">
+                <a:solidFill>
+                  <a:schemeClr val="tx1"/>
+                </a:solidFill>
+              </a:rPr>
+              <a:t>F</a:t>
+            </a:r>
+            <a:endParaRPr lang="sv-SE" dirty="0">
+              <a:solidFill>
+                <a:schemeClr val="tx1"/>
+              </a:solidFill>
+            </a:endParaRPr>
+          </a:p>
+        </p:txBody>
+      </p:sp>
       <p:grpSp>
         <p:nvGrpSpPr>
-          <p:cNvPr id="5" name="Grupp 7"/>
+          <p:cNvPr id="25" name="Grupp 7"/>
           <p:cNvGrpSpPr>
             <a:grpSpLocks/>
           </p:cNvGrpSpPr>
           <p:nvPr/>
         </p:nvGrpSpPr>
         <p:grpSpPr bwMode="auto">
-          <a:xfrm>
-            <a:off x="1331640" y="1371055"/>
-            <a:ext cx="936625" cy="288925"/>
+          <a:xfrm rot="16200000">
+            <a:off x="1742436" y="2346070"/>
+            <a:ext cx="1444884" cy="288925"/>
             <a:chOff x="2555776" y="692696"/>
             <a:chExt cx="936104" cy="288032"/>
           </a:xfrm>
         </p:grpSpPr>
         <p:cxnSp>
           <p:nvCxnSpPr>
-            <p:cNvPr id="6" name="Rak 5"/>
+            <p:cNvPr id="26" name="Rak 5"/>
             <p:cNvCxnSpPr/>
             <p:nvPr/>
           </p:nvCxnSpPr>
@@ -5012,7 +6632,7 @@
         </p:cxnSp>
         <p:sp>
           <p:nvSpPr>
-            <p:cNvPr id="7" name="Rektangel 6"/>
+            <p:cNvPr id="27" name="Rektangel 6"/>
             <p:cNvSpPr/>
             <p:nvPr/>
           </p:nvSpPr>
@@ -5067,7 +6687,219 @@
       </p:grpSp>
       <p:grpSp>
         <p:nvGrpSpPr>
-          <p:cNvPr id="8" name="Grupp 15"/>
+          <p:cNvPr id="28" name="Grupp 7"/>
+          <p:cNvGrpSpPr>
+            <a:grpSpLocks/>
+          </p:cNvGrpSpPr>
+          <p:nvPr/>
+        </p:nvGrpSpPr>
+        <p:grpSpPr bwMode="auto">
+          <a:xfrm rot="5400000">
+            <a:off x="1991496" y="3284761"/>
+            <a:ext cx="936625" cy="288925"/>
+            <a:chOff x="2555776" y="692696"/>
+            <a:chExt cx="936104" cy="288032"/>
+          </a:xfrm>
+        </p:grpSpPr>
+        <p:cxnSp>
+          <p:nvCxnSpPr>
+            <p:cNvPr id="29" name="Rak 5"/>
+            <p:cNvCxnSpPr/>
+            <p:nvPr/>
+          </p:nvCxnSpPr>
+          <p:spPr>
+            <a:xfrm>
+              <a:off x="2555776" y="836712"/>
+              <a:ext cx="936104" cy="0"/>
+            </a:xfrm>
+            <a:prstGeom prst="line">
+              <a:avLst/>
+            </a:prstGeom>
+            <a:ln w="9525">
+              <a:solidFill>
+                <a:schemeClr val="tx1"/>
+              </a:solidFill>
+            </a:ln>
+          </p:spPr>
+          <p:style>
+            <a:lnRef idx="1">
+              <a:schemeClr val="accent1"/>
+            </a:lnRef>
+            <a:fillRef idx="0">
+              <a:schemeClr val="accent1"/>
+            </a:fillRef>
+            <a:effectRef idx="0">
+              <a:schemeClr val="accent1"/>
+            </a:effectRef>
+            <a:fontRef idx="minor">
+              <a:schemeClr val="tx1"/>
+            </a:fontRef>
+          </p:style>
+        </p:cxnSp>
+        <p:sp>
+          <p:nvSpPr>
+            <p:cNvPr id="30" name="Rektangel 6"/>
+            <p:cNvSpPr/>
+            <p:nvPr/>
+          </p:nvSpPr>
+          <p:spPr>
+            <a:xfrm>
+              <a:off x="3420483" y="692696"/>
+              <a:ext cx="71397" cy="288032"/>
+            </a:xfrm>
+            <a:prstGeom prst="rect">
+              <a:avLst/>
+            </a:prstGeom>
+            <a:noFill/>
+            <a:ln w="9525">
+              <a:solidFill>
+                <a:schemeClr val="tx1"/>
+              </a:solidFill>
+            </a:ln>
+          </p:spPr>
+          <p:style>
+            <a:lnRef idx="2">
+              <a:schemeClr val="accent1">
+                <a:shade val="50000"/>
+              </a:schemeClr>
+            </a:lnRef>
+            <a:fillRef idx="1">
+              <a:schemeClr val="accent1"/>
+            </a:fillRef>
+            <a:effectRef idx="0">
+              <a:schemeClr val="accent1"/>
+            </a:effectRef>
+            <a:fontRef idx="minor">
+              <a:schemeClr val="lt1"/>
+            </a:fontRef>
+          </p:style>
+          <p:txBody>
+            <a:bodyPr anchor="ctr"/>
+            <a:lstStyle/>
+            <a:p>
+              <a:pPr algn="ctr" fontAlgn="auto">
+                <a:spcBef>
+                  <a:spcPts val="0"/>
+                </a:spcBef>
+                <a:spcAft>
+                  <a:spcPts val="0"/>
+                </a:spcAft>
+                <a:defRPr/>
+              </a:pPr>
+              <a:endParaRPr lang="sv-SE"/>
+            </a:p>
+          </p:txBody>
+        </p:sp>
+      </p:grpSp>
+      <p:grpSp>
+        <p:nvGrpSpPr>
+          <p:cNvPr id="31" name="Grupp 7"/>
+          <p:cNvGrpSpPr>
+            <a:grpSpLocks/>
+          </p:cNvGrpSpPr>
+          <p:nvPr/>
+        </p:nvGrpSpPr>
+        <p:grpSpPr bwMode="auto">
+          <a:xfrm rot="16200000">
+            <a:off x="2443536" y="3092140"/>
+            <a:ext cx="956739" cy="288925"/>
+            <a:chOff x="2555776" y="692696"/>
+            <a:chExt cx="936104" cy="288032"/>
+          </a:xfrm>
+        </p:grpSpPr>
+        <p:cxnSp>
+          <p:nvCxnSpPr>
+            <p:cNvPr id="32" name="Rak 5"/>
+            <p:cNvCxnSpPr/>
+            <p:nvPr/>
+          </p:nvCxnSpPr>
+          <p:spPr>
+            <a:xfrm>
+              <a:off x="2555776" y="836712"/>
+              <a:ext cx="936104" cy="0"/>
+            </a:xfrm>
+            <a:prstGeom prst="line">
+              <a:avLst/>
+            </a:prstGeom>
+            <a:ln w="9525">
+              <a:solidFill>
+                <a:schemeClr val="tx1"/>
+              </a:solidFill>
+            </a:ln>
+          </p:spPr>
+          <p:style>
+            <a:lnRef idx="1">
+              <a:schemeClr val="accent1"/>
+            </a:lnRef>
+            <a:fillRef idx="0">
+              <a:schemeClr val="accent1"/>
+            </a:fillRef>
+            <a:effectRef idx="0">
+              <a:schemeClr val="accent1"/>
+            </a:effectRef>
+            <a:fontRef idx="minor">
+              <a:schemeClr val="tx1"/>
+            </a:fontRef>
+          </p:style>
+        </p:cxnSp>
+        <p:sp>
+          <p:nvSpPr>
+            <p:cNvPr id="33" name="Rektangel 6"/>
+            <p:cNvSpPr/>
+            <p:nvPr/>
+          </p:nvSpPr>
+          <p:spPr>
+            <a:xfrm>
+              <a:off x="3420483" y="692696"/>
+              <a:ext cx="71397" cy="288032"/>
+            </a:xfrm>
+            <a:prstGeom prst="rect">
+              <a:avLst/>
+            </a:prstGeom>
+            <a:noFill/>
+            <a:ln w="9525">
+              <a:solidFill>
+                <a:schemeClr val="tx1"/>
+              </a:solidFill>
+            </a:ln>
+          </p:spPr>
+          <p:style>
+            <a:lnRef idx="2">
+              <a:schemeClr val="accent1">
+                <a:shade val="50000"/>
+              </a:schemeClr>
+            </a:lnRef>
+            <a:fillRef idx="1">
+              <a:schemeClr val="accent1"/>
+            </a:fillRef>
+            <a:effectRef idx="0">
+              <a:schemeClr val="accent1"/>
+            </a:effectRef>
+            <a:fontRef idx="minor">
+              <a:schemeClr val="lt1"/>
+            </a:fontRef>
+          </p:style>
+          <p:txBody>
+            <a:bodyPr anchor="ctr"/>
+            <a:lstStyle/>
+            <a:p>
+              <a:pPr algn="ctr" fontAlgn="auto">
+                <a:spcBef>
+                  <a:spcPts val="0"/>
+                </a:spcBef>
+                <a:spcAft>
+                  <a:spcPts val="0"/>
+                </a:spcAft>
+                <a:defRPr/>
+              </a:pPr>
+              <a:endParaRPr lang="sv-SE"/>
+            </a:p>
+          </p:txBody>
+        </p:sp>
+      </p:grpSp>
+      <p:grpSp>
+        <p:nvGrpSpPr>
+          <p:cNvPr id="42" name="Grupp 15"/>
           <p:cNvGrpSpPr>
             <a:grpSpLocks/>
           </p:cNvGrpSpPr>
@@ -5075,15 +6907,15 @@
         </p:nvGrpSpPr>
         <p:grpSpPr bwMode="auto">
           <a:xfrm>
-            <a:off x="4842917" y="1556792"/>
-            <a:ext cx="1079500" cy="288925"/>
+            <a:off x="1707813" y="3071158"/>
+            <a:ext cx="756755" cy="204596"/>
             <a:chOff x="4499992" y="692696"/>
             <a:chExt cx="1080120" cy="288032"/>
           </a:xfrm>
         </p:grpSpPr>
         <p:grpSp>
           <p:nvGrpSpPr>
-            <p:cNvPr id="9" name="Grupp 8"/>
+            <p:cNvPr id="43" name="Grupp 8"/>
             <p:cNvGrpSpPr>
               <a:grpSpLocks/>
             </p:cNvGrpSpPr>
@@ -5099,7 +6931,7 @@
           </p:grpSpPr>
           <p:cxnSp>
             <p:nvCxnSpPr>
-              <p:cNvPr id="14" name="Rak 9"/>
+              <p:cNvPr id="48" name="Rak 9"/>
               <p:cNvCxnSpPr/>
               <p:nvPr/>
             </p:nvCxnSpPr>
@@ -5134,7 +6966,7 @@
           </p:cxnSp>
           <p:sp>
             <p:nvSpPr>
-              <p:cNvPr id="15" name="Rektangel 10"/>
+              <p:cNvPr id="49" name="Rektangel 10"/>
               <p:cNvSpPr/>
               <p:nvPr/>
             </p:nvSpPr>
@@ -5189,7 +7021,7 @@
         </p:grpSp>
         <p:grpSp>
           <p:nvGrpSpPr>
-            <p:cNvPr id="10" name="Grupp 11"/>
+            <p:cNvPr id="44" name="Grupp 11"/>
             <p:cNvGrpSpPr>
               <a:grpSpLocks/>
             </p:cNvGrpSpPr>
@@ -5205,7 +7037,7 @@
           </p:grpSpPr>
           <p:cxnSp>
             <p:nvCxnSpPr>
-              <p:cNvPr id="12" name="Rak 12"/>
+              <p:cNvPr id="46" name="Rak 12"/>
               <p:cNvCxnSpPr/>
               <p:nvPr/>
             </p:nvCxnSpPr>
@@ -5240,7 +7072,7 @@
           </p:cxnSp>
           <p:sp>
             <p:nvSpPr>
-              <p:cNvPr id="13" name="Rektangel 13"/>
+              <p:cNvPr id="47" name="Rektangel 13"/>
               <p:cNvSpPr/>
               <p:nvPr/>
             </p:nvSpPr>
@@ -5295,7 +7127,7 @@
         </p:grpSp>
         <p:sp>
           <p:nvSpPr>
-            <p:cNvPr id="11" name="Ellips 14"/>
+            <p:cNvPr id="45" name="Ellips 14"/>
             <p:cNvSpPr/>
             <p:nvPr/>
           </p:nvSpPr>
@@ -5350,16 +7182,539 @@
           </p:txBody>
         </p:sp>
       </p:grpSp>
-      <p:sp>
-        <p:nvSpPr>
-          <p:cNvPr id="16" name="TextBox 15"/>
+      <p:grpSp>
+        <p:nvGrpSpPr>
+          <p:cNvPr id="50" name="Grupp 15"/>
+          <p:cNvGrpSpPr>
+            <a:grpSpLocks/>
+          </p:cNvGrpSpPr>
+          <p:nvPr/>
+        </p:nvGrpSpPr>
+        <p:grpSpPr bwMode="auto">
+          <a:xfrm>
+            <a:off x="2464877" y="2613770"/>
+            <a:ext cx="1351297" cy="288925"/>
+            <a:chOff x="4499992" y="692696"/>
+            <a:chExt cx="1080120" cy="288032"/>
+          </a:xfrm>
+        </p:grpSpPr>
+        <p:grpSp>
+          <p:nvGrpSpPr>
+            <p:cNvPr id="51" name="Grupp 8"/>
+            <p:cNvGrpSpPr>
+              <a:grpSpLocks/>
+            </p:cNvGrpSpPr>
+            <p:nvPr/>
+          </p:nvGrpSpPr>
+          <p:grpSpPr bwMode="auto">
+            <a:xfrm>
+              <a:off x="4644008" y="692696"/>
+              <a:ext cx="936104" cy="288032"/>
+              <a:chOff x="2555776" y="692696"/>
+              <a:chExt cx="936104" cy="288032"/>
+            </a:xfrm>
+          </p:grpSpPr>
+          <p:cxnSp>
+            <p:nvCxnSpPr>
+              <p:cNvPr id="56" name="Rak 9"/>
+              <p:cNvCxnSpPr/>
+              <p:nvPr/>
+            </p:nvCxnSpPr>
+            <p:spPr>
+              <a:xfrm>
+                <a:off x="2556305" y="836712"/>
+                <a:ext cx="935575" cy="0"/>
+              </a:xfrm>
+              <a:prstGeom prst="line">
+                <a:avLst/>
+              </a:prstGeom>
+              <a:ln w="9525">
+                <a:solidFill>
+                  <a:schemeClr val="tx1"/>
+                </a:solidFill>
+              </a:ln>
+            </p:spPr>
+            <p:style>
+              <a:lnRef idx="1">
+                <a:schemeClr val="accent1"/>
+              </a:lnRef>
+              <a:fillRef idx="0">
+                <a:schemeClr val="accent1"/>
+              </a:fillRef>
+              <a:effectRef idx="0">
+                <a:schemeClr val="accent1"/>
+              </a:effectRef>
+              <a:fontRef idx="minor">
+                <a:schemeClr val="tx1"/>
+              </a:fontRef>
+            </p:style>
+          </p:cxnSp>
+          <p:sp>
+            <p:nvSpPr>
+              <p:cNvPr id="57" name="Rektangel 10"/>
+              <p:cNvSpPr/>
+              <p:nvPr/>
+            </p:nvSpPr>
+            <p:spPr>
+              <a:xfrm>
+                <a:off x="3420401" y="692696"/>
+                <a:ext cx="71479" cy="288032"/>
+              </a:xfrm>
+              <a:prstGeom prst="rect">
+                <a:avLst/>
+              </a:prstGeom>
+              <a:noFill/>
+              <a:ln w="9525">
+                <a:solidFill>
+                  <a:schemeClr val="tx1"/>
+                </a:solidFill>
+              </a:ln>
+            </p:spPr>
+            <p:style>
+              <a:lnRef idx="2">
+                <a:schemeClr val="accent1">
+                  <a:shade val="50000"/>
+                </a:schemeClr>
+              </a:lnRef>
+              <a:fillRef idx="1">
+                <a:schemeClr val="accent1"/>
+              </a:fillRef>
+              <a:effectRef idx="0">
+                <a:schemeClr val="accent1"/>
+              </a:effectRef>
+              <a:fontRef idx="minor">
+                <a:schemeClr val="lt1"/>
+              </a:fontRef>
+            </p:style>
+            <p:txBody>
+              <a:bodyPr anchor="ctr"/>
+              <a:lstStyle/>
+              <a:p>
+                <a:pPr algn="ctr" fontAlgn="auto">
+                  <a:spcBef>
+                    <a:spcPts val="0"/>
+                  </a:spcBef>
+                  <a:spcAft>
+                    <a:spcPts val="0"/>
+                  </a:spcAft>
+                  <a:defRPr/>
+                </a:pPr>
+                <a:endParaRPr lang="sv-SE"/>
+              </a:p>
+            </p:txBody>
+          </p:sp>
+        </p:grpSp>
+        <p:grpSp>
+          <p:nvGrpSpPr>
+            <p:cNvPr id="52" name="Grupp 11"/>
+            <p:cNvGrpSpPr>
+              <a:grpSpLocks/>
+            </p:cNvGrpSpPr>
+            <p:nvPr/>
+          </p:nvGrpSpPr>
+          <p:grpSpPr bwMode="auto">
+            <a:xfrm rot="10800000">
+              <a:off x="4499992" y="692696"/>
+              <a:ext cx="936104" cy="288032"/>
+              <a:chOff x="2555776" y="692696"/>
+              <a:chExt cx="936104" cy="288032"/>
+            </a:xfrm>
+          </p:grpSpPr>
+          <p:cxnSp>
+            <p:nvCxnSpPr>
+              <p:cNvPr id="54" name="Rak 12"/>
+              <p:cNvCxnSpPr/>
+              <p:nvPr/>
+            </p:nvCxnSpPr>
+            <p:spPr>
+              <a:xfrm>
+                <a:off x="2556306" y="836712"/>
+                <a:ext cx="935574" cy="0"/>
+              </a:xfrm>
+              <a:prstGeom prst="line">
+                <a:avLst/>
+              </a:prstGeom>
+              <a:ln w="9525">
+                <a:solidFill>
+                  <a:schemeClr val="tx1"/>
+                </a:solidFill>
+              </a:ln>
+            </p:spPr>
+            <p:style>
+              <a:lnRef idx="1">
+                <a:schemeClr val="accent1"/>
+              </a:lnRef>
+              <a:fillRef idx="0">
+                <a:schemeClr val="accent1"/>
+              </a:fillRef>
+              <a:effectRef idx="0">
+                <a:schemeClr val="accent1"/>
+              </a:effectRef>
+              <a:fontRef idx="minor">
+                <a:schemeClr val="tx1"/>
+              </a:fontRef>
+            </p:style>
+          </p:cxnSp>
+          <p:sp>
+            <p:nvSpPr>
+              <p:cNvPr id="55" name="Rektangel 13"/>
+              <p:cNvSpPr/>
+              <p:nvPr/>
+            </p:nvSpPr>
+            <p:spPr>
+              <a:xfrm>
+                <a:off x="3420402" y="692696"/>
+                <a:ext cx="71478" cy="288032"/>
+              </a:xfrm>
+              <a:prstGeom prst="rect">
+                <a:avLst/>
+              </a:prstGeom>
+              <a:noFill/>
+              <a:ln w="9525">
+                <a:solidFill>
+                  <a:schemeClr val="tx1"/>
+                </a:solidFill>
+              </a:ln>
+            </p:spPr>
+            <p:style>
+              <a:lnRef idx="2">
+                <a:schemeClr val="accent1">
+                  <a:shade val="50000"/>
+                </a:schemeClr>
+              </a:lnRef>
+              <a:fillRef idx="1">
+                <a:schemeClr val="accent1"/>
+              </a:fillRef>
+              <a:effectRef idx="0">
+                <a:schemeClr val="accent1"/>
+              </a:effectRef>
+              <a:fontRef idx="minor">
+                <a:schemeClr val="lt1"/>
+              </a:fontRef>
+            </p:style>
+            <p:txBody>
+              <a:bodyPr anchor="ctr"/>
+              <a:lstStyle/>
+              <a:p>
+                <a:pPr algn="ctr" fontAlgn="auto">
+                  <a:spcBef>
+                    <a:spcPts val="0"/>
+                  </a:spcBef>
+                  <a:spcAft>
+                    <a:spcPts val="0"/>
+                  </a:spcAft>
+                  <a:defRPr/>
+                </a:pPr>
+                <a:endParaRPr lang="sv-SE"/>
+              </a:p>
+            </p:txBody>
+          </p:sp>
+        </p:grpSp>
+        <p:sp>
+          <p:nvSpPr>
+            <p:cNvPr id="53" name="Ellips 14"/>
+            <p:cNvSpPr/>
+            <p:nvPr/>
+          </p:nvSpPr>
+          <p:spPr>
+            <a:xfrm>
+              <a:off x="5003518" y="795565"/>
+              <a:ext cx="73067" cy="72799"/>
+            </a:xfrm>
+            <a:prstGeom prst="ellipse">
+              <a:avLst/>
+            </a:prstGeom>
+            <a:solidFill>
+              <a:schemeClr val="tx1"/>
+            </a:solidFill>
+            <a:ln>
+              <a:solidFill>
+                <a:schemeClr val="tx1"/>
+              </a:solidFill>
+            </a:ln>
+          </p:spPr>
+          <p:style>
+            <a:lnRef idx="2">
+              <a:schemeClr val="accent1">
+                <a:shade val="50000"/>
+              </a:schemeClr>
+            </a:lnRef>
+            <a:fillRef idx="1">
+              <a:schemeClr val="accent1"/>
+            </a:fillRef>
+            <a:effectRef idx="0">
+              <a:schemeClr val="accent1"/>
+            </a:effectRef>
+            <a:fontRef idx="minor">
+              <a:schemeClr val="lt1"/>
+            </a:fontRef>
+          </p:style>
+          <p:txBody>
+            <a:bodyPr anchor="ctr"/>
+            <a:lstStyle/>
+            <a:p>
+              <a:pPr algn="ctr" fontAlgn="auto">
+                <a:spcBef>
+                  <a:spcPts val="0"/>
+                </a:spcBef>
+                <a:spcAft>
+                  <a:spcPts val="0"/>
+                </a:spcAft>
+                <a:defRPr/>
+              </a:pPr>
+              <a:endParaRPr lang="sv-SE"/>
+            </a:p>
+          </p:txBody>
+        </p:sp>
+      </p:grpSp>
+      <p:grpSp>
+        <p:nvGrpSpPr>
+          <p:cNvPr id="58" name="Grupp 7"/>
+          <p:cNvGrpSpPr>
+            <a:grpSpLocks/>
+          </p:cNvGrpSpPr>
+          <p:nvPr/>
+        </p:nvGrpSpPr>
+        <p:grpSpPr bwMode="auto">
+          <a:xfrm>
+            <a:off x="2928120" y="3570510"/>
+            <a:ext cx="798630" cy="288925"/>
+            <a:chOff x="2555776" y="692696"/>
+            <a:chExt cx="936104" cy="288032"/>
+          </a:xfrm>
+        </p:grpSpPr>
+        <p:cxnSp>
+          <p:nvCxnSpPr>
+            <p:cNvPr id="59" name="Rak 5"/>
+            <p:cNvCxnSpPr/>
+            <p:nvPr/>
+          </p:nvCxnSpPr>
+          <p:spPr>
+            <a:xfrm>
+              <a:off x="2555776" y="836712"/>
+              <a:ext cx="936104" cy="0"/>
+            </a:xfrm>
+            <a:prstGeom prst="line">
+              <a:avLst/>
+            </a:prstGeom>
+            <a:ln w="9525">
+              <a:solidFill>
+                <a:schemeClr val="tx1"/>
+              </a:solidFill>
+            </a:ln>
+          </p:spPr>
+          <p:style>
+            <a:lnRef idx="1">
+              <a:schemeClr val="accent1"/>
+            </a:lnRef>
+            <a:fillRef idx="0">
+              <a:schemeClr val="accent1"/>
+            </a:fillRef>
+            <a:effectRef idx="0">
+              <a:schemeClr val="accent1"/>
+            </a:effectRef>
+            <a:fontRef idx="minor">
+              <a:schemeClr val="tx1"/>
+            </a:fontRef>
+          </p:style>
+        </p:cxnSp>
+        <p:sp>
+          <p:nvSpPr>
+            <p:cNvPr id="60" name="Rektangel 6"/>
+            <p:cNvSpPr/>
+            <p:nvPr/>
+          </p:nvSpPr>
+          <p:spPr>
+            <a:xfrm>
+              <a:off x="3420483" y="692696"/>
+              <a:ext cx="71397" cy="288032"/>
+            </a:xfrm>
+            <a:prstGeom prst="rect">
+              <a:avLst/>
+            </a:prstGeom>
+            <a:noFill/>
+            <a:ln w="9525">
+              <a:solidFill>
+                <a:schemeClr val="tx1"/>
+              </a:solidFill>
+            </a:ln>
+          </p:spPr>
+          <p:style>
+            <a:lnRef idx="2">
+              <a:schemeClr val="accent1">
+                <a:shade val="50000"/>
+              </a:schemeClr>
+            </a:lnRef>
+            <a:fillRef idx="1">
+              <a:schemeClr val="accent1"/>
+            </a:fillRef>
+            <a:effectRef idx="0">
+              <a:schemeClr val="accent1"/>
+            </a:effectRef>
+            <a:fontRef idx="minor">
+              <a:schemeClr val="lt1"/>
+            </a:fontRef>
+          </p:style>
+          <p:txBody>
+            <a:bodyPr anchor="ctr"/>
+            <a:lstStyle/>
+            <a:p>
+              <a:pPr algn="ctr" fontAlgn="auto">
+                <a:spcBef>
+                  <a:spcPts val="0"/>
+                </a:spcBef>
+                <a:spcAft>
+                  <a:spcPts val="0"/>
+                </a:spcAft>
+                <a:defRPr/>
+              </a:pPr>
+              <a:endParaRPr lang="sv-SE"/>
+            </a:p>
+          </p:txBody>
+        </p:sp>
+      </p:grpSp>
+      <p:sp>
+        <p:nvSpPr>
+          <p:cNvPr id="2" name="Flowchart: Connector 1"/>
+          <p:cNvSpPr/>
+          <p:nvPr/>
+        </p:nvSpPr>
+        <p:spPr>
+          <a:xfrm>
+            <a:off x="2891407" y="3077990"/>
+            <a:ext cx="60995" cy="76735"/>
+          </a:xfrm>
+          <a:prstGeom prst="flowChartConnector">
+            <a:avLst/>
+          </a:prstGeom>
+        </p:spPr>
+        <p:style>
+          <a:lnRef idx="2">
+            <a:schemeClr val="dk1">
+              <a:shade val="50000"/>
+            </a:schemeClr>
+          </a:lnRef>
+          <a:fillRef idx="1">
+            <a:schemeClr val="dk1"/>
+          </a:fillRef>
+          <a:effectRef idx="0">
+            <a:schemeClr val="dk1"/>
+          </a:effectRef>
+          <a:fontRef idx="minor">
+            <a:schemeClr val="lt1"/>
+          </a:fontRef>
+        </p:style>
+        <p:txBody>
+          <a:bodyPr rtlCol="0" anchor="ctr"/>
+          <a:lstStyle/>
+          <a:p>
+            <a:pPr algn="ctr"/>
+            <a:endParaRPr lang="sv-SE">
+              <a:solidFill>
+                <a:schemeClr val="tx1"/>
+              </a:solidFill>
+            </a:endParaRPr>
+          </a:p>
+        </p:txBody>
+      </p:sp>
+      <p:sp>
+        <p:nvSpPr>
+          <p:cNvPr id="61" name="Flowchart: Connector 60"/>
+          <p:cNvSpPr/>
+          <p:nvPr/>
+        </p:nvSpPr>
+        <p:spPr>
+          <a:xfrm>
+            <a:off x="2439528" y="2204864"/>
+            <a:ext cx="60995" cy="76735"/>
+          </a:xfrm>
+          <a:prstGeom prst="flowChartConnector">
+            <a:avLst/>
+          </a:prstGeom>
+        </p:spPr>
+        <p:style>
+          <a:lnRef idx="2">
+            <a:schemeClr val="dk1">
+              <a:shade val="50000"/>
+            </a:schemeClr>
+          </a:lnRef>
+          <a:fillRef idx="1">
+            <a:schemeClr val="dk1"/>
+          </a:fillRef>
+          <a:effectRef idx="0">
+            <a:schemeClr val="dk1"/>
+          </a:effectRef>
+          <a:fontRef idx="minor">
+            <a:schemeClr val="lt1"/>
+          </a:fontRef>
+        </p:style>
+        <p:txBody>
+          <a:bodyPr rtlCol="0" anchor="ctr"/>
+          <a:lstStyle/>
+          <a:p>
+            <a:pPr algn="ctr"/>
+            <a:endParaRPr lang="sv-SE">
+              <a:solidFill>
+                <a:schemeClr val="tx1"/>
+              </a:solidFill>
+            </a:endParaRPr>
+          </a:p>
+        </p:txBody>
+      </p:sp>
+      <p:sp>
+        <p:nvSpPr>
+          <p:cNvPr id="62" name="Flowchart: Connector 61"/>
+          <p:cNvSpPr/>
+          <p:nvPr/>
+        </p:nvSpPr>
+        <p:spPr>
+          <a:xfrm>
+            <a:off x="2060594" y="3130409"/>
+            <a:ext cx="60995" cy="76735"/>
+          </a:xfrm>
+          <a:prstGeom prst="flowChartConnector">
+            <a:avLst/>
+          </a:prstGeom>
+        </p:spPr>
+        <p:style>
+          <a:lnRef idx="2">
+            <a:schemeClr val="dk1">
+              <a:shade val="50000"/>
+            </a:schemeClr>
+          </a:lnRef>
+          <a:fillRef idx="1">
+            <a:schemeClr val="dk1"/>
+          </a:fillRef>
+          <a:effectRef idx="0">
+            <a:schemeClr val="dk1"/>
+          </a:effectRef>
+          <a:fontRef idx="minor">
+            <a:schemeClr val="lt1"/>
+          </a:fontRef>
+        </p:style>
+        <p:txBody>
+          <a:bodyPr rtlCol="0" anchor="ctr"/>
+          <a:lstStyle/>
+          <a:p>
+            <a:pPr algn="ctr"/>
+            <a:endParaRPr lang="sv-SE">
+              <a:solidFill>
+                <a:schemeClr val="tx1"/>
+              </a:solidFill>
+            </a:endParaRPr>
+          </a:p>
+        </p:txBody>
+      </p:sp>
+      <p:sp>
+        <p:nvSpPr>
+          <p:cNvPr id="3" name="TextBox 2"/>
           <p:cNvSpPr txBox="1"/>
           <p:nvPr/>
         </p:nvSpPr>
         <p:spPr>
           <a:xfrm>
-            <a:off x="1187624" y="548680"/>
-            <a:ext cx="3389967" cy="369332"/>
+            <a:off x="2609341" y="1386421"/>
+            <a:ext cx="301686" cy="369332"/>
           </a:xfrm>
           <a:prstGeom prst="rect">
             <a:avLst/>
@@ -5374,16 +7729,1284 @@
           <a:p>
             <a:r>
               <a:rPr lang="sv-SE" dirty="0" smtClean="0"/>
-              <a:t>1.5 Primärnycklar i relationsobjekt</a:t>
+              <a:t>1</a:t>
             </a:r>
             <a:endParaRPr lang="sv-SE" dirty="0"/>
           </a:p>
         </p:txBody>
       </p:sp>
+      <p:sp>
+        <p:nvSpPr>
+          <p:cNvPr id="63" name="TextBox 62"/>
+          <p:cNvSpPr txBox="1"/>
+          <p:nvPr/>
+        </p:nvSpPr>
+        <p:spPr>
+          <a:xfrm>
+            <a:off x="2137842" y="2058565"/>
+            <a:ext cx="301686" cy="369332"/>
+          </a:xfrm>
+          <a:prstGeom prst="rect">
+            <a:avLst/>
+          </a:prstGeom>
+          <a:noFill/>
+        </p:spPr>
+        <p:txBody>
+          <a:bodyPr wrap="none" rtlCol="0">
+            <a:spAutoFit/>
+          </a:bodyPr>
+          <a:lstStyle/>
+          <a:p>
+            <a:r>
+              <a:rPr lang="sv-SE" dirty="0"/>
+              <a:t>2</a:t>
+            </a:r>
+          </a:p>
+        </p:txBody>
+      </p:sp>
+      <p:sp>
+        <p:nvSpPr>
+          <p:cNvPr id="64" name="TextBox 63"/>
+          <p:cNvSpPr txBox="1"/>
+          <p:nvPr/>
+        </p:nvSpPr>
+        <p:spPr>
+          <a:xfrm>
+            <a:off x="2989681" y="2321949"/>
+            <a:ext cx="301686" cy="369332"/>
+          </a:xfrm>
+          <a:prstGeom prst="rect">
+            <a:avLst/>
+          </a:prstGeom>
+          <a:noFill/>
+        </p:spPr>
+        <p:txBody>
+          <a:bodyPr wrap="none" rtlCol="0">
+            <a:spAutoFit/>
+          </a:bodyPr>
+          <a:lstStyle/>
+          <a:p>
+            <a:r>
+              <a:rPr lang="sv-SE" dirty="0"/>
+              <a:t>4</a:t>
+            </a:r>
+            <a:endParaRPr lang="sv-SE" dirty="0"/>
+          </a:p>
+        </p:txBody>
+      </p:sp>
+      <p:sp>
+        <p:nvSpPr>
+          <p:cNvPr id="65" name="TextBox 64"/>
+          <p:cNvSpPr txBox="1"/>
+          <p:nvPr/>
+        </p:nvSpPr>
+        <p:spPr>
+          <a:xfrm>
+            <a:off x="2943916" y="2970059"/>
+            <a:ext cx="301686" cy="369332"/>
+          </a:xfrm>
+          <a:prstGeom prst="rect">
+            <a:avLst/>
+          </a:prstGeom>
+          <a:noFill/>
+        </p:spPr>
+        <p:txBody>
+          <a:bodyPr wrap="none" rtlCol="0">
+            <a:spAutoFit/>
+          </a:bodyPr>
+          <a:lstStyle/>
+          <a:p>
+            <a:r>
+              <a:rPr lang="sv-SE" dirty="0" smtClean="0"/>
+              <a:t>5</a:t>
+            </a:r>
+            <a:endParaRPr lang="sv-SE" dirty="0"/>
+          </a:p>
+        </p:txBody>
+      </p:sp>
+      <p:sp>
+        <p:nvSpPr>
+          <p:cNvPr id="66" name="TextBox 65"/>
+          <p:cNvSpPr txBox="1"/>
+          <p:nvPr/>
+        </p:nvSpPr>
+        <p:spPr>
+          <a:xfrm>
+            <a:off x="1935347" y="2790787"/>
+            <a:ext cx="301686" cy="369332"/>
+          </a:xfrm>
+          <a:prstGeom prst="rect">
+            <a:avLst/>
+          </a:prstGeom>
+          <a:noFill/>
+        </p:spPr>
+        <p:txBody>
+          <a:bodyPr wrap="none" rtlCol="0">
+            <a:spAutoFit/>
+          </a:bodyPr>
+          <a:lstStyle/>
+          <a:p>
+            <a:r>
+              <a:rPr lang="sv-SE" dirty="0"/>
+              <a:t>3</a:t>
+            </a:r>
+            <a:endParaRPr lang="sv-SE" dirty="0"/>
+          </a:p>
+        </p:txBody>
+      </p:sp>
+      <p:graphicFrame>
+        <p:nvGraphicFramePr>
+          <p:cNvPr id="67" name="Table 66"/>
+          <p:cNvGraphicFramePr>
+            <a:graphicFrameLocks noGrp="1"/>
+          </p:cNvGraphicFramePr>
+          <p:nvPr>
+            <p:extLst>
+              <p:ext uri="{D42A27DB-BD31-4B8C-83A1-F6EECF244321}">
+                <p14:modId xmlns:p14="http://schemas.microsoft.com/office/powerpoint/2010/main" val="3330592362"/>
+              </p:ext>
+            </p:extLst>
+          </p:nvPr>
+        </p:nvGraphicFramePr>
+        <p:xfrm>
+          <a:off x="5508104" y="1791946"/>
+          <a:ext cx="2423967" cy="2194560"/>
+        </p:xfrm>
+        <a:graphic>
+          <a:graphicData uri="http://schemas.openxmlformats.org/drawingml/2006/table">
+            <a:tbl>
+              <a:tblPr firstRow="1" bandRow="1">
+                <a:effectLst>
+                  <a:outerShdw blurRad="50800" dist="38100" dir="2700000" algn="tl" rotWithShape="0">
+                    <a:prstClr val="black">
+                      <a:alpha val="40000"/>
+                    </a:prstClr>
+                  </a:outerShdw>
+                </a:effectLst>
+                <a:tableStyleId>{5C22544A-7EE6-4342-B048-85BDC9FD1C3A}</a:tableStyleId>
+              </a:tblPr>
+              <a:tblGrid>
+                <a:gridCol w="346281"/>
+                <a:gridCol w="346281"/>
+                <a:gridCol w="346281"/>
+                <a:gridCol w="346281"/>
+                <a:gridCol w="346281"/>
+                <a:gridCol w="346281"/>
+                <a:gridCol w="346281"/>
+              </a:tblGrid>
+              <a:tr h="278258">
+                <a:tc>
+                  <a:txBody>
+                    <a:bodyPr/>
+                    <a:lstStyle/>
+                    <a:p>
+                      <a:endParaRPr lang="sv-SE" b="1" dirty="0">
+                        <a:solidFill>
+                          <a:schemeClr val="bg1"/>
+                        </a:solidFill>
+                      </a:endParaRPr>
+                    </a:p>
+                  </a:txBody>
+                  <a:tcPr/>
+                </a:tc>
+                <a:tc>
+                  <a:txBody>
+                    <a:bodyPr/>
+                    <a:lstStyle/>
+                    <a:p>
+                      <a:r>
+                        <a:rPr lang="sv-SE" dirty="0" smtClean="0"/>
+                        <a:t>A</a:t>
+                      </a:r>
+                      <a:endParaRPr lang="sv-SE" dirty="0"/>
+                    </a:p>
+                  </a:txBody>
+                  <a:tcPr/>
+                </a:tc>
+                <a:tc>
+                  <a:txBody>
+                    <a:bodyPr/>
+                    <a:lstStyle/>
+                    <a:p>
+                      <a:r>
+                        <a:rPr lang="sv-SE" dirty="0" smtClean="0"/>
+                        <a:t>B</a:t>
+                      </a:r>
+                      <a:endParaRPr lang="sv-SE" dirty="0"/>
+                    </a:p>
+                  </a:txBody>
+                  <a:tcPr/>
+                </a:tc>
+                <a:tc>
+                  <a:txBody>
+                    <a:bodyPr/>
+                    <a:lstStyle/>
+                    <a:p>
+                      <a:r>
+                        <a:rPr lang="sv-SE" dirty="0" smtClean="0"/>
+                        <a:t>C</a:t>
+                      </a:r>
+                      <a:endParaRPr lang="sv-SE" dirty="0"/>
+                    </a:p>
+                  </a:txBody>
+                  <a:tcPr/>
+                </a:tc>
+                <a:tc>
+                  <a:txBody>
+                    <a:bodyPr/>
+                    <a:lstStyle/>
+                    <a:p>
+                      <a:r>
+                        <a:rPr lang="sv-SE" dirty="0" smtClean="0"/>
+                        <a:t>D</a:t>
+                      </a:r>
+                      <a:endParaRPr lang="sv-SE" dirty="0"/>
+                    </a:p>
+                  </a:txBody>
+                  <a:tcPr/>
+                </a:tc>
+                <a:tc>
+                  <a:txBody>
+                    <a:bodyPr/>
+                    <a:lstStyle/>
+                    <a:p>
+                      <a:r>
+                        <a:rPr lang="sv-SE" dirty="0" smtClean="0"/>
+                        <a:t>E</a:t>
+                      </a:r>
+                      <a:endParaRPr lang="sv-SE" dirty="0"/>
+                    </a:p>
+                  </a:txBody>
+                  <a:tcPr/>
+                </a:tc>
+                <a:tc>
+                  <a:txBody>
+                    <a:bodyPr/>
+                    <a:lstStyle/>
+                    <a:p>
+                      <a:r>
+                        <a:rPr lang="sv-SE" dirty="0" smtClean="0"/>
+                        <a:t>F</a:t>
+                      </a:r>
+                      <a:endParaRPr lang="sv-SE" dirty="0"/>
+                    </a:p>
+                  </a:txBody>
+                  <a:tcPr/>
+                </a:tc>
+              </a:tr>
+              <a:tr h="278258">
+                <a:tc>
+                  <a:txBody>
+                    <a:bodyPr/>
+                    <a:lstStyle/>
+                    <a:p>
+                      <a:r>
+                        <a:rPr lang="sv-SE" b="1" dirty="0" smtClean="0">
+                          <a:solidFill>
+                            <a:schemeClr val="bg1"/>
+                          </a:solidFill>
+                        </a:rPr>
+                        <a:t>1</a:t>
+                      </a:r>
+                      <a:endParaRPr lang="sv-SE" b="1" dirty="0">
+                        <a:solidFill>
+                          <a:schemeClr val="bg1"/>
+                        </a:solidFill>
+                      </a:endParaRPr>
+                    </a:p>
+                  </a:txBody>
+                  <a:tcPr>
+                    <a:solidFill>
+                      <a:schemeClr val="accent1"/>
+                    </a:solidFill>
+                  </a:tcPr>
+                </a:tc>
+                <a:tc>
+                  <a:txBody>
+                    <a:bodyPr/>
+                    <a:lstStyle/>
+                    <a:p>
+                      <a:r>
+                        <a:rPr lang="sv-SE" dirty="0" smtClean="0"/>
+                        <a:t>X</a:t>
+                      </a:r>
+                      <a:endParaRPr lang="sv-SE" dirty="0"/>
+                    </a:p>
+                  </a:txBody>
+                  <a:tcPr/>
+                </a:tc>
+                <a:tc>
+                  <a:txBody>
+                    <a:bodyPr/>
+                    <a:lstStyle/>
+                    <a:p>
+                      <a:r>
+                        <a:rPr lang="sv-SE" dirty="0" smtClean="0"/>
+                        <a:t>X</a:t>
+                      </a:r>
+                      <a:endParaRPr lang="sv-SE" dirty="0"/>
+                    </a:p>
+                  </a:txBody>
+                  <a:tcPr/>
+                </a:tc>
+                <a:tc>
+                  <a:txBody>
+                    <a:bodyPr/>
+                    <a:lstStyle/>
+                    <a:p>
+                      <a:endParaRPr lang="sv-SE"/>
+                    </a:p>
+                  </a:txBody>
+                  <a:tcPr/>
+                </a:tc>
+                <a:tc>
+                  <a:txBody>
+                    <a:bodyPr/>
+                    <a:lstStyle/>
+                    <a:p>
+                      <a:endParaRPr lang="sv-SE"/>
+                    </a:p>
+                  </a:txBody>
+                  <a:tcPr/>
+                </a:tc>
+                <a:tc>
+                  <a:txBody>
+                    <a:bodyPr/>
+                    <a:lstStyle/>
+                    <a:p>
+                      <a:endParaRPr lang="sv-SE"/>
+                    </a:p>
+                  </a:txBody>
+                  <a:tcPr/>
+                </a:tc>
+                <a:tc>
+                  <a:txBody>
+                    <a:bodyPr/>
+                    <a:lstStyle/>
+                    <a:p>
+                      <a:endParaRPr lang="sv-SE"/>
+                    </a:p>
+                  </a:txBody>
+                  <a:tcPr/>
+                </a:tc>
+              </a:tr>
+              <a:tr h="278258">
+                <a:tc>
+                  <a:txBody>
+                    <a:bodyPr/>
+                    <a:lstStyle/>
+                    <a:p>
+                      <a:r>
+                        <a:rPr lang="sv-SE" b="1" dirty="0" smtClean="0">
+                          <a:solidFill>
+                            <a:schemeClr val="bg1"/>
+                          </a:solidFill>
+                        </a:rPr>
+                        <a:t>2</a:t>
+                      </a:r>
+                      <a:endParaRPr lang="sv-SE" b="1" dirty="0">
+                        <a:solidFill>
+                          <a:schemeClr val="bg1"/>
+                        </a:solidFill>
+                      </a:endParaRPr>
+                    </a:p>
+                  </a:txBody>
+                  <a:tcPr>
+                    <a:solidFill>
+                      <a:schemeClr val="accent1"/>
+                    </a:solidFill>
+                  </a:tcPr>
+                </a:tc>
+                <a:tc>
+                  <a:txBody>
+                    <a:bodyPr/>
+                    <a:lstStyle/>
+                    <a:p>
+                      <a:r>
+                        <a:rPr lang="sv-SE" dirty="0" smtClean="0"/>
+                        <a:t>X</a:t>
+                      </a:r>
+                      <a:endParaRPr lang="sv-SE" dirty="0"/>
+                    </a:p>
+                  </a:txBody>
+                  <a:tcPr/>
+                </a:tc>
+                <a:tc>
+                  <a:txBody>
+                    <a:bodyPr/>
+                    <a:lstStyle/>
+                    <a:p>
+                      <a:r>
+                        <a:rPr lang="sv-SE" dirty="0" smtClean="0"/>
+                        <a:t>X</a:t>
+                      </a:r>
+                      <a:endParaRPr lang="sv-SE" dirty="0"/>
+                    </a:p>
+                  </a:txBody>
+                  <a:tcPr/>
+                </a:tc>
+                <a:tc>
+                  <a:txBody>
+                    <a:bodyPr/>
+                    <a:lstStyle/>
+                    <a:p>
+                      <a:endParaRPr lang="sv-SE"/>
+                    </a:p>
+                  </a:txBody>
+                  <a:tcPr/>
+                </a:tc>
+                <a:tc>
+                  <a:txBody>
+                    <a:bodyPr/>
+                    <a:lstStyle/>
+                    <a:p>
+                      <a:endParaRPr lang="sv-SE"/>
+                    </a:p>
+                  </a:txBody>
+                  <a:tcPr/>
+                </a:tc>
+                <a:tc>
+                  <a:txBody>
+                    <a:bodyPr/>
+                    <a:lstStyle/>
+                    <a:p>
+                      <a:endParaRPr lang="sv-SE"/>
+                    </a:p>
+                  </a:txBody>
+                  <a:tcPr/>
+                </a:tc>
+                <a:tc>
+                  <a:txBody>
+                    <a:bodyPr/>
+                    <a:lstStyle/>
+                    <a:p>
+                      <a:r>
+                        <a:rPr lang="sv-SE" dirty="0" smtClean="0"/>
+                        <a:t>X</a:t>
+                      </a:r>
+                      <a:endParaRPr lang="sv-SE" dirty="0"/>
+                    </a:p>
+                  </a:txBody>
+                  <a:tcPr/>
+                </a:tc>
+              </a:tr>
+              <a:tr h="278258">
+                <a:tc>
+                  <a:txBody>
+                    <a:bodyPr/>
+                    <a:lstStyle/>
+                    <a:p>
+                      <a:r>
+                        <a:rPr lang="sv-SE" b="1" dirty="0" smtClean="0">
+                          <a:solidFill>
+                            <a:schemeClr val="bg1"/>
+                          </a:solidFill>
+                        </a:rPr>
+                        <a:t>3</a:t>
+                      </a:r>
+                      <a:endParaRPr lang="sv-SE" b="1" dirty="0">
+                        <a:solidFill>
+                          <a:schemeClr val="bg1"/>
+                        </a:solidFill>
+                      </a:endParaRPr>
+                    </a:p>
+                  </a:txBody>
+                  <a:tcPr>
+                    <a:solidFill>
+                      <a:schemeClr val="accent1"/>
+                    </a:solidFill>
+                  </a:tcPr>
+                </a:tc>
+                <a:tc>
+                  <a:txBody>
+                    <a:bodyPr/>
+                    <a:lstStyle/>
+                    <a:p>
+                      <a:r>
+                        <a:rPr lang="sv-SE" dirty="0" smtClean="0"/>
+                        <a:t>X</a:t>
+                      </a:r>
+                      <a:endParaRPr lang="sv-SE" dirty="0"/>
+                    </a:p>
+                  </a:txBody>
+                  <a:tcPr/>
+                </a:tc>
+                <a:tc>
+                  <a:txBody>
+                    <a:bodyPr/>
+                    <a:lstStyle/>
+                    <a:p>
+                      <a:r>
+                        <a:rPr lang="sv-SE" dirty="0" smtClean="0"/>
+                        <a:t>X</a:t>
+                      </a:r>
+                      <a:endParaRPr lang="sv-SE" dirty="0"/>
+                    </a:p>
+                  </a:txBody>
+                  <a:tcPr/>
+                </a:tc>
+                <a:tc>
+                  <a:txBody>
+                    <a:bodyPr/>
+                    <a:lstStyle/>
+                    <a:p>
+                      <a:r>
+                        <a:rPr lang="sv-SE" dirty="0" smtClean="0"/>
+                        <a:t>X</a:t>
+                      </a:r>
+                      <a:endParaRPr lang="sv-SE" dirty="0"/>
+                    </a:p>
+                  </a:txBody>
+                  <a:tcPr/>
+                </a:tc>
+                <a:tc>
+                  <a:txBody>
+                    <a:bodyPr/>
+                    <a:lstStyle/>
+                    <a:p>
+                      <a:endParaRPr lang="sv-SE" dirty="0"/>
+                    </a:p>
+                  </a:txBody>
+                  <a:tcPr/>
+                </a:tc>
+                <a:tc>
+                  <a:txBody>
+                    <a:bodyPr/>
+                    <a:lstStyle/>
+                    <a:p>
+                      <a:endParaRPr lang="sv-SE"/>
+                    </a:p>
+                  </a:txBody>
+                  <a:tcPr/>
+                </a:tc>
+                <a:tc>
+                  <a:txBody>
+                    <a:bodyPr/>
+                    <a:lstStyle/>
+                    <a:p>
+                      <a:r>
+                        <a:rPr lang="sv-SE" dirty="0" smtClean="0"/>
+                        <a:t>X</a:t>
+                      </a:r>
+                      <a:endParaRPr lang="sv-SE" dirty="0"/>
+                    </a:p>
+                  </a:txBody>
+                  <a:tcPr/>
+                </a:tc>
+              </a:tr>
+              <a:tr h="278258">
+                <a:tc>
+                  <a:txBody>
+                    <a:bodyPr/>
+                    <a:lstStyle/>
+                    <a:p>
+                      <a:r>
+                        <a:rPr lang="sv-SE" b="1" dirty="0" smtClean="0">
+                          <a:solidFill>
+                            <a:schemeClr val="bg1"/>
+                          </a:solidFill>
+                        </a:rPr>
+                        <a:t>4</a:t>
+                      </a:r>
+                      <a:endParaRPr lang="sv-SE" b="1" dirty="0">
+                        <a:solidFill>
+                          <a:schemeClr val="bg1"/>
+                        </a:solidFill>
+                      </a:endParaRPr>
+                    </a:p>
+                  </a:txBody>
+                  <a:tcPr>
+                    <a:solidFill>
+                      <a:schemeClr val="accent1"/>
+                    </a:solidFill>
+                  </a:tcPr>
+                </a:tc>
+                <a:tc>
+                  <a:txBody>
+                    <a:bodyPr/>
+                    <a:lstStyle/>
+                    <a:p>
+                      <a:r>
+                        <a:rPr lang="sv-SE" dirty="0" smtClean="0"/>
+                        <a:t>X</a:t>
+                      </a:r>
+                      <a:endParaRPr lang="sv-SE" dirty="0"/>
+                    </a:p>
+                  </a:txBody>
+                  <a:tcPr/>
+                </a:tc>
+                <a:tc>
+                  <a:txBody>
+                    <a:bodyPr/>
+                    <a:lstStyle/>
+                    <a:p>
+                      <a:r>
+                        <a:rPr lang="sv-SE" dirty="0" smtClean="0"/>
+                        <a:t>X</a:t>
+                      </a:r>
+                      <a:endParaRPr lang="sv-SE" dirty="0"/>
+                    </a:p>
+                  </a:txBody>
+                  <a:tcPr/>
+                </a:tc>
+                <a:tc>
+                  <a:txBody>
+                    <a:bodyPr/>
+                    <a:lstStyle/>
+                    <a:p>
+                      <a:endParaRPr lang="sv-SE"/>
+                    </a:p>
+                  </a:txBody>
+                  <a:tcPr/>
+                </a:tc>
+                <a:tc>
+                  <a:txBody>
+                    <a:bodyPr/>
+                    <a:lstStyle/>
+                    <a:p>
+                      <a:r>
+                        <a:rPr lang="sv-SE" dirty="0" smtClean="0"/>
+                        <a:t>X</a:t>
+                      </a:r>
+                      <a:endParaRPr lang="sv-SE" dirty="0"/>
+                    </a:p>
+                  </a:txBody>
+                  <a:tcPr/>
+                </a:tc>
+                <a:tc>
+                  <a:txBody>
+                    <a:bodyPr/>
+                    <a:lstStyle/>
+                    <a:p>
+                      <a:endParaRPr lang="sv-SE"/>
+                    </a:p>
+                  </a:txBody>
+                  <a:tcPr/>
+                </a:tc>
+                <a:tc>
+                  <a:txBody>
+                    <a:bodyPr/>
+                    <a:lstStyle/>
+                    <a:p>
+                      <a:r>
+                        <a:rPr lang="sv-SE" dirty="0" smtClean="0"/>
+                        <a:t>X</a:t>
+                      </a:r>
+                      <a:endParaRPr lang="sv-SE" dirty="0"/>
+                    </a:p>
+                  </a:txBody>
+                  <a:tcPr/>
+                </a:tc>
+              </a:tr>
+              <a:tr h="278258">
+                <a:tc>
+                  <a:txBody>
+                    <a:bodyPr/>
+                    <a:lstStyle/>
+                    <a:p>
+                      <a:r>
+                        <a:rPr lang="sv-SE" b="1" dirty="0" smtClean="0">
+                          <a:solidFill>
+                            <a:schemeClr val="bg1"/>
+                          </a:solidFill>
+                        </a:rPr>
+                        <a:t>5</a:t>
+                      </a:r>
+                      <a:endParaRPr lang="sv-SE" b="1" dirty="0">
+                        <a:solidFill>
+                          <a:schemeClr val="bg1"/>
+                        </a:solidFill>
+                      </a:endParaRPr>
+                    </a:p>
+                  </a:txBody>
+                  <a:tcPr>
+                    <a:solidFill>
+                      <a:schemeClr val="accent1"/>
+                    </a:solidFill>
+                  </a:tcPr>
+                </a:tc>
+                <a:tc>
+                  <a:txBody>
+                    <a:bodyPr/>
+                    <a:lstStyle/>
+                    <a:p>
+                      <a:r>
+                        <a:rPr lang="sv-SE" dirty="0" smtClean="0"/>
+                        <a:t>X</a:t>
+                      </a:r>
+                      <a:endParaRPr lang="sv-SE" dirty="0"/>
+                    </a:p>
+                  </a:txBody>
+                  <a:tcPr/>
+                </a:tc>
+                <a:tc>
+                  <a:txBody>
+                    <a:bodyPr/>
+                    <a:lstStyle/>
+                    <a:p>
+                      <a:r>
+                        <a:rPr lang="sv-SE" dirty="0" smtClean="0"/>
+                        <a:t>X</a:t>
+                      </a:r>
+                      <a:endParaRPr lang="sv-SE" dirty="0"/>
+                    </a:p>
+                  </a:txBody>
+                  <a:tcPr/>
+                </a:tc>
+                <a:tc>
+                  <a:txBody>
+                    <a:bodyPr/>
+                    <a:lstStyle/>
+                    <a:p>
+                      <a:endParaRPr lang="sv-SE"/>
+                    </a:p>
+                  </a:txBody>
+                  <a:tcPr/>
+                </a:tc>
+                <a:tc>
+                  <a:txBody>
+                    <a:bodyPr/>
+                    <a:lstStyle/>
+                    <a:p>
+                      <a:r>
+                        <a:rPr lang="sv-SE" dirty="0" smtClean="0"/>
+                        <a:t>X</a:t>
+                      </a:r>
+                      <a:endParaRPr lang="sv-SE" dirty="0"/>
+                    </a:p>
+                  </a:txBody>
+                  <a:tcPr/>
+                </a:tc>
+                <a:tc>
+                  <a:txBody>
+                    <a:bodyPr/>
+                    <a:lstStyle/>
+                    <a:p>
+                      <a:r>
+                        <a:rPr lang="sv-SE" dirty="0" smtClean="0"/>
+                        <a:t>X</a:t>
+                      </a:r>
+                      <a:endParaRPr lang="sv-SE" dirty="0"/>
+                    </a:p>
+                  </a:txBody>
+                  <a:tcPr/>
+                </a:tc>
+                <a:tc>
+                  <a:txBody>
+                    <a:bodyPr/>
+                    <a:lstStyle/>
+                    <a:p>
+                      <a:r>
+                        <a:rPr lang="sv-SE" dirty="0" smtClean="0"/>
+                        <a:t>X</a:t>
+                      </a:r>
+                      <a:endParaRPr lang="sv-SE" dirty="0"/>
+                    </a:p>
+                  </a:txBody>
+                  <a:tcPr/>
+                </a:tc>
+              </a:tr>
+            </a:tbl>
+          </a:graphicData>
+        </a:graphic>
+      </p:graphicFrame>
     </p:spTree>
     <p:extLst>
       <p:ext uri="{BB962C8B-B14F-4D97-AF65-F5344CB8AC3E}">
         <p14:creationId xmlns:p14="http://schemas.microsoft.com/office/powerpoint/2010/main" val="611816650"/>
+      </p:ext>
+    </p:extLst>
+  </p:cSld>
+  <p:clrMapOvr>
+    <a:masterClrMapping/>
+  </p:clrMapOvr>
+</p:sld>
+</file>
+
+<file path=ppt/slides/slide7.xml><?xml version="1.0" encoding="utf-8"?>
+<p:sld xmlns:a="http://schemas.openxmlformats.org/drawingml/2006/main" xmlns:r="http://schemas.openxmlformats.org/officeDocument/2006/relationships" xmlns:p="http://schemas.openxmlformats.org/presentationml/2006/main">
+  <p:cSld>
+    <p:spTree>
+      <p:nvGrpSpPr>
+        <p:cNvPr id="1" name=""/>
+        <p:cNvGrpSpPr/>
+        <p:nvPr/>
+      </p:nvGrpSpPr>
+      <p:grpSpPr>
+        <a:xfrm>
+          <a:off x="0" y="0"/>
+          <a:ext cx="0" cy="0"/>
+          <a:chOff x="0" y="0"/>
+          <a:chExt cx="0" cy="0"/>
+        </a:xfrm>
+      </p:grpSpPr>
+      <p:sp>
+        <p:nvSpPr>
+          <p:cNvPr id="2" name="Title 1"/>
+          <p:cNvSpPr>
+            <a:spLocks noGrp="1"/>
+          </p:cNvSpPr>
+          <p:nvPr>
+            <p:ph type="title"/>
+          </p:nvPr>
+        </p:nvSpPr>
+        <p:spPr>
+          <a:xfrm>
+            <a:off x="457200" y="274638"/>
+            <a:ext cx="8075240" cy="562074"/>
+          </a:xfrm>
+        </p:spPr>
+        <p:style>
+          <a:lnRef idx="1">
+            <a:schemeClr val="accent1"/>
+          </a:lnRef>
+          <a:fillRef idx="2">
+            <a:schemeClr val="accent1"/>
+          </a:fillRef>
+          <a:effectRef idx="1">
+            <a:schemeClr val="accent1"/>
+          </a:effectRef>
+          <a:fontRef idx="minor">
+            <a:schemeClr val="dk1"/>
+          </a:fontRef>
+        </p:style>
+        <p:txBody>
+          <a:bodyPr>
+            <a:normAutofit fontScale="90000"/>
+          </a:bodyPr>
+          <a:lstStyle/>
+          <a:p>
+            <a:r>
+              <a:rPr lang="sv-SE" dirty="0" smtClean="0"/>
+              <a:t>Uppgift 2 – Normalisera Kund</a:t>
+            </a:r>
+            <a:endParaRPr lang="sv-SE" dirty="0"/>
+          </a:p>
+        </p:txBody>
+      </p:sp>
+      <p:sp>
+        <p:nvSpPr>
+          <p:cNvPr id="4" name="Rektangel 3"/>
+          <p:cNvSpPr/>
+          <p:nvPr/>
+        </p:nvSpPr>
+        <p:spPr>
+          <a:xfrm>
+            <a:off x="982517" y="1052736"/>
+            <a:ext cx="936625" cy="503238"/>
+          </a:xfrm>
+          <a:prstGeom prst="rect">
+            <a:avLst/>
+          </a:prstGeom>
+          <a:noFill/>
+          <a:ln>
+            <a:solidFill>
+              <a:schemeClr val="tx1"/>
+            </a:solidFill>
+          </a:ln>
+        </p:spPr>
+        <p:style>
+          <a:lnRef idx="2">
+            <a:schemeClr val="accent1">
+              <a:shade val="50000"/>
+            </a:schemeClr>
+          </a:lnRef>
+          <a:fillRef idx="1">
+            <a:schemeClr val="accent1"/>
+          </a:fillRef>
+          <a:effectRef idx="0">
+            <a:schemeClr val="accent1"/>
+          </a:effectRef>
+          <a:fontRef idx="minor">
+            <a:schemeClr val="lt1"/>
+          </a:fontRef>
+        </p:style>
+        <p:txBody>
+          <a:bodyPr anchor="ctr"/>
+          <a:lstStyle/>
+          <a:p>
+            <a:pPr algn="ctr" fontAlgn="auto">
+              <a:spcBef>
+                <a:spcPts val="0"/>
+              </a:spcBef>
+              <a:spcAft>
+                <a:spcPts val="0"/>
+              </a:spcAft>
+              <a:defRPr/>
+            </a:pPr>
+            <a:r>
+              <a:rPr lang="sv-SE" dirty="0" smtClean="0">
+                <a:solidFill>
+                  <a:schemeClr val="tx1"/>
+                </a:solidFill>
+              </a:rPr>
+              <a:t>Kund</a:t>
+            </a:r>
+            <a:endParaRPr lang="sv-SE" dirty="0">
+              <a:solidFill>
+                <a:schemeClr val="tx1"/>
+              </a:solidFill>
+            </a:endParaRPr>
+          </a:p>
+        </p:txBody>
+      </p:sp>
+      <p:sp>
+        <p:nvSpPr>
+          <p:cNvPr id="17" name="TextBox 16"/>
+          <p:cNvSpPr txBox="1"/>
+          <p:nvPr/>
+        </p:nvSpPr>
+        <p:spPr>
+          <a:xfrm>
+            <a:off x="982517" y="1700808"/>
+            <a:ext cx="1456811" cy="954107"/>
+          </a:xfrm>
+          <a:prstGeom prst="rect">
+            <a:avLst/>
+          </a:prstGeom>
+          <a:noFill/>
+        </p:spPr>
+        <p:txBody>
+          <a:bodyPr wrap="square" rtlCol="0">
+            <a:spAutoFit/>
+          </a:bodyPr>
+          <a:lstStyle/>
+          <a:p>
+            <a:r>
+              <a:rPr lang="sv-SE" sz="1400" dirty="0" smtClean="0"/>
+              <a:t>KundID N, Pk</a:t>
+            </a:r>
+          </a:p>
+          <a:p>
+            <a:r>
+              <a:rPr lang="sv-SE" sz="1400" dirty="0" smtClean="0"/>
+              <a:t>Kundnr N</a:t>
+            </a:r>
+          </a:p>
+          <a:p>
+            <a:r>
+              <a:rPr lang="sv-SE" sz="1400" dirty="0" smtClean="0"/>
+              <a:t>Kundnamn C</a:t>
+            </a:r>
+          </a:p>
+          <a:p>
+            <a:r>
+              <a:rPr lang="sv-SE" sz="1400" dirty="0"/>
+              <a:t>Postadress </a:t>
+            </a:r>
+            <a:r>
+              <a:rPr lang="sv-SE" sz="1400" dirty="0" smtClean="0"/>
+              <a:t>N</a:t>
+            </a:r>
+            <a:endParaRPr lang="sv-SE" sz="1400" dirty="0"/>
+          </a:p>
+        </p:txBody>
+      </p:sp>
+      <p:sp>
+        <p:nvSpPr>
+          <p:cNvPr id="18" name="Rektangel 3"/>
+          <p:cNvSpPr/>
+          <p:nvPr/>
+        </p:nvSpPr>
+        <p:spPr>
+          <a:xfrm>
+            <a:off x="3896140" y="1054614"/>
+            <a:ext cx="936625" cy="503238"/>
+          </a:xfrm>
+          <a:prstGeom prst="rect">
+            <a:avLst/>
+          </a:prstGeom>
+          <a:noFill/>
+          <a:ln>
+            <a:solidFill>
+              <a:schemeClr val="tx1"/>
+            </a:solidFill>
+          </a:ln>
+        </p:spPr>
+        <p:style>
+          <a:lnRef idx="2">
+            <a:schemeClr val="accent1">
+              <a:shade val="50000"/>
+            </a:schemeClr>
+          </a:lnRef>
+          <a:fillRef idx="1">
+            <a:schemeClr val="accent1"/>
+          </a:fillRef>
+          <a:effectRef idx="0">
+            <a:schemeClr val="accent1"/>
+          </a:effectRef>
+          <a:fontRef idx="minor">
+            <a:schemeClr val="lt1"/>
+          </a:fontRef>
+        </p:style>
+        <p:txBody>
+          <a:bodyPr anchor="ctr"/>
+          <a:lstStyle/>
+          <a:p>
+            <a:pPr algn="ctr" fontAlgn="auto">
+              <a:spcBef>
+                <a:spcPts val="0"/>
+              </a:spcBef>
+              <a:spcAft>
+                <a:spcPts val="0"/>
+              </a:spcAft>
+              <a:defRPr/>
+            </a:pPr>
+            <a:r>
+              <a:rPr lang="sv-SE" dirty="0" smtClean="0">
+                <a:solidFill>
+                  <a:schemeClr val="tx1"/>
+                </a:solidFill>
+              </a:rPr>
+              <a:t>Kontakt</a:t>
+            </a:r>
+            <a:endParaRPr lang="sv-SE" dirty="0">
+              <a:solidFill>
+                <a:schemeClr val="tx1"/>
+              </a:solidFill>
+            </a:endParaRPr>
+          </a:p>
+        </p:txBody>
+      </p:sp>
+      <p:sp>
+        <p:nvSpPr>
+          <p:cNvPr id="20" name="TextBox 19"/>
+          <p:cNvSpPr txBox="1"/>
+          <p:nvPr/>
+        </p:nvSpPr>
+        <p:spPr>
+          <a:xfrm>
+            <a:off x="3896140" y="1724037"/>
+            <a:ext cx="1620137" cy="1169551"/>
+          </a:xfrm>
+          <a:prstGeom prst="rect">
+            <a:avLst/>
+          </a:prstGeom>
+          <a:noFill/>
+        </p:spPr>
+        <p:txBody>
+          <a:bodyPr wrap="square" rtlCol="0">
+            <a:spAutoFit/>
+          </a:bodyPr>
+          <a:lstStyle/>
+          <a:p>
+            <a:r>
+              <a:rPr lang="sv-SE" sz="1400" dirty="0" smtClean="0"/>
+              <a:t>KontaktID N, Pk</a:t>
+            </a:r>
+          </a:p>
+          <a:p>
+            <a:r>
+              <a:rPr lang="sv-SE" sz="1400" dirty="0" smtClean="0"/>
+              <a:t>Namn C</a:t>
+            </a:r>
+          </a:p>
+          <a:p>
+            <a:r>
+              <a:rPr lang="sv-SE" sz="1400" dirty="0" smtClean="0"/>
+              <a:t>KundID</a:t>
+            </a:r>
+          </a:p>
+          <a:p>
+            <a:endParaRPr lang="sv-SE" sz="1400" dirty="0" smtClean="0"/>
+          </a:p>
+          <a:p>
+            <a:endParaRPr lang="sv-SE" sz="1400" dirty="0" smtClean="0"/>
+          </a:p>
+        </p:txBody>
+      </p:sp>
+      <p:graphicFrame>
+        <p:nvGraphicFramePr>
+          <p:cNvPr id="30" name="Object 29"/>
+          <p:cNvGraphicFramePr>
+            <a:graphicFrameLocks noChangeAspect="1"/>
+          </p:cNvGraphicFramePr>
+          <p:nvPr>
+            <p:extLst>
+              <p:ext uri="{D42A27DB-BD31-4B8C-83A1-F6EECF244321}">
+                <p14:modId xmlns:p14="http://schemas.microsoft.com/office/powerpoint/2010/main" val="3668967579"/>
+              </p:ext>
+            </p:extLst>
+          </p:nvPr>
+        </p:nvGraphicFramePr>
+        <p:xfrm>
+          <a:off x="250825" y="3213100"/>
+          <a:ext cx="5757863" cy="1008063"/>
+        </p:xfrm>
+        <a:graphic>
+          <a:graphicData uri="http://schemas.openxmlformats.org/presentationml/2006/ole">
+            <mc:AlternateContent xmlns:mc="http://schemas.openxmlformats.org/markup-compatibility/2006">
+              <mc:Choice xmlns:v="urn:schemas-microsoft-com:vml" Requires="v">
+                <p:oleObj spid="_x0000_s6161" name="Worksheet" r:id="rId3" imgW="3781321" imgH="771660" progId="Excel.Sheet.12">
+                  <p:embed/>
+                </p:oleObj>
+              </mc:Choice>
+              <mc:Fallback>
+                <p:oleObj name="Worksheet" r:id="rId3" imgW="3781321" imgH="771660" progId="Excel.Sheet.12">
+                  <p:embed/>
+                  <p:pic>
+                    <p:nvPicPr>
+                      <p:cNvPr id="0" name="Object 1"/>
+                      <p:cNvPicPr>
+                        <a:picLocks noChangeAspect="1" noChangeArrowheads="1"/>
+                      </p:cNvPicPr>
+                      <p:nvPr/>
+                    </p:nvPicPr>
+                    <p:blipFill>
+                      <a:blip r:embed="rId4"/>
+                      <a:srcRect/>
+                      <a:stretch>
+                        <a:fillRect/>
+                      </a:stretch>
+                    </p:blipFill>
+                    <p:spPr bwMode="auto">
+                      <a:xfrm>
+                        <a:off x="250825" y="3213100"/>
+                        <a:ext cx="5757863" cy="1008063"/>
+                      </a:xfrm>
+                      <a:prstGeom prst="rect">
+                        <a:avLst/>
+                      </a:prstGeom>
+                      <a:noFill/>
+                      <a:ln>
+                        <a:noFill/>
+                      </a:ln>
+                    </p:spPr>
+                  </p:pic>
+                </p:oleObj>
+              </mc:Fallback>
+            </mc:AlternateContent>
+          </a:graphicData>
+        </a:graphic>
+      </p:graphicFrame>
+      <p:graphicFrame>
+        <p:nvGraphicFramePr>
+          <p:cNvPr id="31" name="Object 30"/>
+          <p:cNvGraphicFramePr>
+            <a:graphicFrameLocks noChangeAspect="1"/>
+          </p:cNvGraphicFramePr>
+          <p:nvPr>
+            <p:extLst>
+              <p:ext uri="{D42A27DB-BD31-4B8C-83A1-F6EECF244321}">
+                <p14:modId xmlns:p14="http://schemas.microsoft.com/office/powerpoint/2010/main" val="961933179"/>
+              </p:ext>
+            </p:extLst>
+          </p:nvPr>
+        </p:nvGraphicFramePr>
+        <p:xfrm>
+          <a:off x="250825" y="4700588"/>
+          <a:ext cx="3146425" cy="2032000"/>
+        </p:xfrm>
+        <a:graphic>
+          <a:graphicData uri="http://schemas.openxmlformats.org/presentationml/2006/ole">
+            <mc:AlternateContent xmlns:mc="http://schemas.openxmlformats.org/markup-compatibility/2006">
+              <mc:Choice xmlns:v="urn:schemas-microsoft-com:vml" Requires="v">
+                <p:oleObj spid="_x0000_s6162" name="Worksheet" r:id="rId5" imgW="2067057" imgH="1552500" progId="Excel.Sheet.12">
+                  <p:embed/>
+                </p:oleObj>
+              </mc:Choice>
+              <mc:Fallback>
+                <p:oleObj name="Worksheet" r:id="rId5" imgW="2067057" imgH="1552500" progId="Excel.Sheet.12">
+                  <p:embed/>
+                  <p:pic>
+                    <p:nvPicPr>
+                      <p:cNvPr id="0" name="Object 29"/>
+                      <p:cNvPicPr>
+                        <a:picLocks noChangeAspect="1" noChangeArrowheads="1"/>
+                      </p:cNvPicPr>
+                      <p:nvPr/>
+                    </p:nvPicPr>
+                    <p:blipFill>
+                      <a:blip r:embed="rId6"/>
+                      <a:srcRect/>
+                      <a:stretch>
+                        <a:fillRect/>
+                      </a:stretch>
+                    </p:blipFill>
+                    <p:spPr bwMode="auto">
+                      <a:xfrm>
+                        <a:off x="250825" y="4700588"/>
+                        <a:ext cx="3146425" cy="2032000"/>
+                      </a:xfrm>
+                      <a:prstGeom prst="rect">
+                        <a:avLst/>
+                      </a:prstGeom>
+                      <a:noFill/>
+                      <a:ln>
+                        <a:noFill/>
+                      </a:ln>
+                    </p:spPr>
+                  </p:pic>
+                </p:oleObj>
+              </mc:Fallback>
+            </mc:AlternateContent>
+          </a:graphicData>
+        </a:graphic>
+      </p:graphicFrame>
+      <p:sp>
+        <p:nvSpPr>
+          <p:cNvPr id="32" name="TextBox 31"/>
+          <p:cNvSpPr txBox="1"/>
+          <p:nvPr/>
+        </p:nvSpPr>
+        <p:spPr>
+          <a:xfrm>
+            <a:off x="201185" y="2843644"/>
+            <a:ext cx="720080" cy="369332"/>
+          </a:xfrm>
+          <a:prstGeom prst="rect">
+            <a:avLst/>
+          </a:prstGeom>
+          <a:noFill/>
+        </p:spPr>
+        <p:txBody>
+          <a:bodyPr wrap="square" rtlCol="0">
+            <a:spAutoFit/>
+          </a:bodyPr>
+          <a:lstStyle/>
+          <a:p>
+            <a:r>
+              <a:rPr lang="sv-SE" dirty="0" smtClean="0"/>
+              <a:t>Kund</a:t>
+            </a:r>
+            <a:endParaRPr lang="sv-SE" dirty="0"/>
+          </a:p>
+        </p:txBody>
+      </p:sp>
+      <p:sp>
+        <p:nvSpPr>
+          <p:cNvPr id="33" name="TextBox 32"/>
+          <p:cNvSpPr txBox="1"/>
+          <p:nvPr/>
+        </p:nvSpPr>
+        <p:spPr>
+          <a:xfrm>
+            <a:off x="207256" y="4365104"/>
+            <a:ext cx="1008112" cy="369332"/>
+          </a:xfrm>
+          <a:prstGeom prst="rect">
+            <a:avLst/>
+          </a:prstGeom>
+          <a:noFill/>
+        </p:spPr>
+        <p:txBody>
+          <a:bodyPr wrap="square" rtlCol="0">
+            <a:spAutoFit/>
+          </a:bodyPr>
+          <a:lstStyle/>
+          <a:p>
+            <a:r>
+              <a:rPr lang="sv-SE" dirty="0" smtClean="0"/>
+              <a:t>Kontakt</a:t>
+            </a:r>
+            <a:endParaRPr lang="sv-SE" dirty="0"/>
+          </a:p>
+        </p:txBody>
+      </p:sp>
+    </p:spTree>
+    <p:extLst>
+      <p:ext uri="{BB962C8B-B14F-4D97-AF65-F5344CB8AC3E}">
+        <p14:creationId xmlns:p14="http://schemas.microsoft.com/office/powerpoint/2010/main" val="97280515"/>
       </p:ext>
     </p:extLst>
   </p:cSld>

</xml_diff>